<commit_message>
wait for review results
</commit_message>
<xml_diff>
--- a/DesignDoc/OWCI Sofware Proposal.pptx
+++ b/DesignDoc/OWCI Sofware Proposal.pptx
@@ -5,8 +5,8 @@
     <p:sldMasterId id="2147483660" r:id="rId1"/>
   </p:sldMasterIdLst>
   <p:sldIdLst>
-    <p:sldId id="264" r:id="rId2"/>
-    <p:sldId id="263" r:id="rId3"/>
+    <p:sldId id="263" r:id="rId2"/>
+    <p:sldId id="264" r:id="rId3"/>
     <p:sldId id="267" r:id="rId4"/>
     <p:sldId id="266" r:id="rId5"/>
     <p:sldId id="265" r:id="rId6"/>
@@ -3682,167 +3682,331 @@
           <a:p>
             <a:r>
               <a:rPr lang="en-US" dirty="0" smtClean="0"/>
-              <a:t>Function Blocks of OWCI Software</a:t>
+              <a:t>Overview </a:t>
+            </a:r>
+            <a:r>
+              <a:rPr lang="en-US" dirty="0" smtClean="0"/>
+              <a:t>of OWCI Software</a:t>
             </a:r>
             <a:endParaRPr lang="en-US" dirty="0"/>
           </a:p>
         </p:txBody>
       </p:sp>
-      <p:sp>
-        <p:nvSpPr>
-          <p:cNvPr id="6" name="Content Placeholder 5"/>
-          <p:cNvSpPr>
-            <a:spLocks noGrp="1"/>
-          </p:cNvSpPr>
-          <p:nvPr>
-            <p:ph idx="1"/>
-          </p:nvPr>
-        </p:nvSpPr>
-        <p:spPr/>
-        <p:txBody>
-          <a:bodyPr>
-            <a:normAutofit fontScale="62500" lnSpcReduction="20000"/>
-          </a:bodyPr>
+      <p:pic>
+        <p:nvPicPr>
+          <p:cNvPr id="3" name="图片 2"/>
+          <p:cNvPicPr>
+            <a:picLocks noChangeAspect="1"/>
+          </p:cNvPicPr>
+          <p:nvPr/>
+        </p:nvPicPr>
+        <p:blipFill>
+          <a:blip r:embed="rId2"/>
+          <a:stretch>
+            <a:fillRect/>
+          </a:stretch>
+        </p:blipFill>
+        <p:spPr>
+          <a:xfrm>
+            <a:off x="152400" y="1000125"/>
+            <a:ext cx="8794153" cy="5705475"/>
+          </a:xfrm>
+          <a:prstGeom prst="rect">
+            <a:avLst/>
+          </a:prstGeom>
+        </p:spPr>
+      </p:pic>
+      <p:sp>
+        <p:nvSpPr>
+          <p:cNvPr id="6" name="圆角矩形 5"/>
+          <p:cNvSpPr/>
+          <p:nvPr/>
+        </p:nvSpPr>
+        <p:spPr>
+          <a:xfrm>
+            <a:off x="609600" y="1676400"/>
+            <a:ext cx="838200" cy="228600"/>
+          </a:xfrm>
+          <a:prstGeom prst="roundRect">
+            <a:avLst/>
+          </a:prstGeom>
+          <a:noFill/>
+        </p:spPr>
+        <p:style>
+          <a:lnRef idx="2">
+            <a:schemeClr val="accent1">
+              <a:shade val="50000"/>
+            </a:schemeClr>
+          </a:lnRef>
+          <a:fillRef idx="1">
+            <a:schemeClr val="accent1"/>
+          </a:fillRef>
+          <a:effectRef idx="0">
+            <a:schemeClr val="accent1"/>
+          </a:effectRef>
+          <a:fontRef idx="minor">
+            <a:schemeClr val="lt1"/>
+          </a:fontRef>
+        </p:style>
+        <p:txBody>
+          <a:bodyPr rtlCol="0" anchor="ctr"/>
           <a:lstStyle/>
           <a:p>
-            <a:r>
-              <a:rPr lang="en-US" b="1" dirty="0" smtClean="0"/>
-              <a:t>General Setting</a:t>
-            </a:r>
-          </a:p>
-          <a:p>
-            <a:pPr lvl="1"/>
-            <a:r>
-              <a:rPr lang="en-US" dirty="0" smtClean="0"/>
-              <a:t>Hardware control, include pilot width and device address.</a:t>
-            </a:r>
-          </a:p>
-          <a:p>
-            <a:pPr lvl="1"/>
-            <a:endParaRPr lang="en-US" dirty="0" smtClean="0"/>
-          </a:p>
-          <a:p>
-            <a:r>
-              <a:rPr lang="en-US" b="1" dirty="0" smtClean="0"/>
-              <a:t>Test Mode</a:t>
-            </a:r>
-          </a:p>
-          <a:p>
-            <a:pPr lvl="1"/>
-            <a:r>
-              <a:rPr lang="en-US" dirty="0" smtClean="0"/>
-              <a:t>Enter Test Mode, supporting different DUTs.</a:t>
-            </a:r>
-          </a:p>
-          <a:p>
-            <a:pPr lvl="1"/>
-            <a:endParaRPr lang="en-US" dirty="0" smtClean="0"/>
-          </a:p>
-          <a:p>
-            <a:r>
-              <a:rPr lang="en-US" b="1" dirty="0" smtClean="0"/>
-              <a:t>Registers Read/Write</a:t>
-            </a:r>
-          </a:p>
-          <a:p>
-            <a:pPr lvl="1"/>
-            <a:r>
-              <a:rPr lang="en-US" dirty="0" smtClean="0"/>
-              <a:t>Single or burst registers read or write.</a:t>
-            </a:r>
-          </a:p>
-          <a:p>
-            <a:pPr lvl="1"/>
-            <a:endParaRPr lang="en-US" dirty="0" smtClean="0"/>
-          </a:p>
-          <a:p>
-            <a:r>
-              <a:rPr lang="en-US" b="1" dirty="0" smtClean="0"/>
-              <a:t>OTP Window</a:t>
-            </a:r>
-          </a:p>
-          <a:p>
-            <a:pPr lvl="1"/>
-            <a:r>
-              <a:rPr lang="en-US" dirty="0" smtClean="0"/>
-              <a:t>OTP operation, bit by bit or byte by byte, load data from a .txt file and save data to a .txt file.</a:t>
-            </a:r>
-          </a:p>
-          <a:p>
-            <a:pPr lvl="1"/>
-            <a:endParaRPr lang="en-US" dirty="0" smtClean="0"/>
-          </a:p>
-          <a:p>
-            <a:r>
-              <a:rPr lang="en-US" b="1" dirty="0" smtClean="0"/>
-              <a:t>Script Window</a:t>
-            </a:r>
-          </a:p>
-          <a:p>
-            <a:pPr lvl="1"/>
-            <a:r>
-              <a:rPr lang="en-US" dirty="0" smtClean="0"/>
-              <a:t>Load script from a .txt file and execute, edit a script and execute or save to .txt file.</a:t>
-            </a:r>
-          </a:p>
-          <a:p>
-            <a:pPr lvl="1"/>
-            <a:endParaRPr lang="en-US" dirty="0" smtClean="0"/>
-          </a:p>
-          <a:p>
-            <a:r>
-              <a:rPr lang="en-US" b="1" dirty="0" smtClean="0"/>
-              <a:t>Fuse</a:t>
-            </a:r>
-          </a:p>
-          <a:p>
-            <a:pPr lvl="1"/>
-            <a:r>
-              <a:rPr lang="en-US" dirty="0" smtClean="0"/>
-              <a:t>Support </a:t>
-            </a:r>
-            <a:r>
-              <a:rPr lang="en-US" dirty="0" err="1" smtClean="0"/>
-              <a:t>eFuse</a:t>
-            </a:r>
-            <a:r>
-              <a:rPr lang="en-US" dirty="0" smtClean="0"/>
-              <a:t>.</a:t>
-            </a:r>
-          </a:p>
-          <a:p>
-            <a:pPr lvl="1"/>
-            <a:endParaRPr lang="en-US" dirty="0" smtClean="0"/>
-          </a:p>
-          <a:p>
-            <a:r>
-              <a:rPr lang="en-US" b="1" dirty="0" smtClean="0"/>
-              <a:t>Operation log</a:t>
-            </a:r>
-          </a:p>
-          <a:p>
-            <a:pPr lvl="1"/>
-            <a:r>
-              <a:rPr lang="en-US" dirty="0" smtClean="0"/>
-              <a:t>Display all the operations include commands and return data</a:t>
-            </a:r>
-            <a:endParaRPr lang="en-US" dirty="0" smtClean="0"/>
-          </a:p>
-          <a:p>
-            <a:endParaRPr lang="en-US" dirty="0" smtClean="0"/>
-          </a:p>
-          <a:p>
-            <a:endParaRPr lang="en-US" dirty="0" smtClean="0"/>
-          </a:p>
-          <a:p>
-            <a:endParaRPr lang="en-US" dirty="0"/>
+            <a:pPr algn="ctr"/>
+            <a:endParaRPr lang="en-US"/>
+          </a:p>
+        </p:txBody>
+      </p:sp>
+      <p:sp>
+        <p:nvSpPr>
+          <p:cNvPr id="7" name="圆角矩形 6"/>
+          <p:cNvSpPr/>
+          <p:nvPr/>
+        </p:nvSpPr>
+        <p:spPr>
+          <a:xfrm>
+            <a:off x="1895475" y="1676400"/>
+            <a:ext cx="838200" cy="228600"/>
+          </a:xfrm>
+          <a:prstGeom prst="roundRect">
+            <a:avLst/>
+          </a:prstGeom>
+          <a:noFill/>
+        </p:spPr>
+        <p:style>
+          <a:lnRef idx="2">
+            <a:schemeClr val="accent1">
+              <a:shade val="50000"/>
+            </a:schemeClr>
+          </a:lnRef>
+          <a:fillRef idx="1">
+            <a:schemeClr val="accent1"/>
+          </a:fillRef>
+          <a:effectRef idx="0">
+            <a:schemeClr val="accent1"/>
+          </a:effectRef>
+          <a:fontRef idx="minor">
+            <a:schemeClr val="lt1"/>
+          </a:fontRef>
+        </p:style>
+        <p:txBody>
+          <a:bodyPr rtlCol="0" anchor="ctr"/>
+          <a:lstStyle/>
+          <a:p>
+            <a:pPr algn="ctr"/>
+            <a:endParaRPr lang="en-US"/>
+          </a:p>
+        </p:txBody>
+      </p:sp>
+      <p:sp>
+        <p:nvSpPr>
+          <p:cNvPr id="8" name="圆角矩形 7"/>
+          <p:cNvSpPr/>
+          <p:nvPr/>
+        </p:nvSpPr>
+        <p:spPr>
+          <a:xfrm>
+            <a:off x="1895475" y="2209800"/>
+            <a:ext cx="838200" cy="228600"/>
+          </a:xfrm>
+          <a:prstGeom prst="roundRect">
+            <a:avLst/>
+          </a:prstGeom>
+          <a:noFill/>
+        </p:spPr>
+        <p:style>
+          <a:lnRef idx="2">
+            <a:schemeClr val="accent1">
+              <a:shade val="50000"/>
+            </a:schemeClr>
+          </a:lnRef>
+          <a:fillRef idx="1">
+            <a:schemeClr val="accent1"/>
+          </a:fillRef>
+          <a:effectRef idx="0">
+            <a:schemeClr val="accent1"/>
+          </a:effectRef>
+          <a:fontRef idx="minor">
+            <a:schemeClr val="lt1"/>
+          </a:fontRef>
+        </p:style>
+        <p:txBody>
+          <a:bodyPr rtlCol="0" anchor="ctr"/>
+          <a:lstStyle/>
+          <a:p>
+            <a:pPr algn="ctr"/>
+            <a:endParaRPr lang="en-US"/>
+          </a:p>
+        </p:txBody>
+      </p:sp>
+      <p:sp>
+        <p:nvSpPr>
+          <p:cNvPr id="9" name="圆角矩形 8"/>
+          <p:cNvSpPr/>
+          <p:nvPr/>
+        </p:nvSpPr>
+        <p:spPr>
+          <a:xfrm>
+            <a:off x="609600" y="3581400"/>
+            <a:ext cx="533400" cy="266700"/>
+          </a:xfrm>
+          <a:prstGeom prst="roundRect">
+            <a:avLst/>
+          </a:prstGeom>
+          <a:noFill/>
+        </p:spPr>
+        <p:style>
+          <a:lnRef idx="2">
+            <a:schemeClr val="accent1">
+              <a:shade val="50000"/>
+            </a:schemeClr>
+          </a:lnRef>
+          <a:fillRef idx="1">
+            <a:schemeClr val="accent1"/>
+          </a:fillRef>
+          <a:effectRef idx="0">
+            <a:schemeClr val="accent1"/>
+          </a:effectRef>
+          <a:fontRef idx="minor">
+            <a:schemeClr val="lt1"/>
+          </a:fontRef>
+        </p:style>
+        <p:txBody>
+          <a:bodyPr rtlCol="0" anchor="ctr"/>
+          <a:lstStyle/>
+          <a:p>
+            <a:pPr algn="ctr"/>
+            <a:endParaRPr lang="en-US"/>
+          </a:p>
+        </p:txBody>
+      </p:sp>
+      <p:sp>
+        <p:nvSpPr>
+          <p:cNvPr id="10" name="圆角矩形 9"/>
+          <p:cNvSpPr/>
+          <p:nvPr/>
+        </p:nvSpPr>
+        <p:spPr>
+          <a:xfrm>
+            <a:off x="590550" y="4914900"/>
+            <a:ext cx="838200" cy="228600"/>
+          </a:xfrm>
+          <a:prstGeom prst="roundRect">
+            <a:avLst/>
+          </a:prstGeom>
+          <a:noFill/>
+        </p:spPr>
+        <p:style>
+          <a:lnRef idx="2">
+            <a:schemeClr val="accent1">
+              <a:shade val="50000"/>
+            </a:schemeClr>
+          </a:lnRef>
+          <a:fillRef idx="1">
+            <a:schemeClr val="accent1"/>
+          </a:fillRef>
+          <a:effectRef idx="0">
+            <a:schemeClr val="accent1"/>
+          </a:effectRef>
+          <a:fontRef idx="minor">
+            <a:schemeClr val="lt1"/>
+          </a:fontRef>
+        </p:style>
+        <p:txBody>
+          <a:bodyPr rtlCol="0" anchor="ctr"/>
+          <a:lstStyle/>
+          <a:p>
+            <a:pPr algn="ctr"/>
+            <a:endParaRPr lang="en-US"/>
+          </a:p>
+        </p:txBody>
+      </p:sp>
+      <p:sp>
+        <p:nvSpPr>
+          <p:cNvPr id="19" name="圆角矩形 18"/>
+          <p:cNvSpPr/>
+          <p:nvPr/>
+        </p:nvSpPr>
+        <p:spPr>
+          <a:xfrm>
+            <a:off x="4419600" y="1676400"/>
+            <a:ext cx="838200" cy="228600"/>
+          </a:xfrm>
+          <a:prstGeom prst="roundRect">
+            <a:avLst/>
+          </a:prstGeom>
+          <a:noFill/>
+        </p:spPr>
+        <p:style>
+          <a:lnRef idx="2">
+            <a:schemeClr val="accent1">
+              <a:shade val="50000"/>
+            </a:schemeClr>
+          </a:lnRef>
+          <a:fillRef idx="1">
+            <a:schemeClr val="accent1"/>
+          </a:fillRef>
+          <a:effectRef idx="0">
+            <a:schemeClr val="accent1"/>
+          </a:effectRef>
+          <a:fontRef idx="minor">
+            <a:schemeClr val="lt1"/>
+          </a:fontRef>
+        </p:style>
+        <p:txBody>
+          <a:bodyPr rtlCol="0" anchor="ctr"/>
+          <a:lstStyle/>
+          <a:p>
+            <a:pPr algn="ctr"/>
+            <a:endParaRPr lang="en-US"/>
+          </a:p>
+        </p:txBody>
+      </p:sp>
+      <p:sp>
+        <p:nvSpPr>
+          <p:cNvPr id="20" name="圆角矩形 19"/>
+          <p:cNvSpPr/>
+          <p:nvPr/>
+        </p:nvSpPr>
+        <p:spPr>
+          <a:xfrm>
+            <a:off x="6105525" y="1676400"/>
+            <a:ext cx="838200" cy="228600"/>
+          </a:xfrm>
+          <a:prstGeom prst="roundRect">
+            <a:avLst/>
+          </a:prstGeom>
+          <a:noFill/>
+        </p:spPr>
+        <p:style>
+          <a:lnRef idx="2">
+            <a:schemeClr val="accent1">
+              <a:shade val="50000"/>
+            </a:schemeClr>
+          </a:lnRef>
+          <a:fillRef idx="1">
+            <a:schemeClr val="accent1"/>
+          </a:fillRef>
+          <a:effectRef idx="0">
+            <a:schemeClr val="accent1"/>
+          </a:effectRef>
+          <a:fontRef idx="minor">
+            <a:schemeClr val="lt1"/>
+          </a:fontRef>
+        </p:style>
+        <p:txBody>
+          <a:bodyPr rtlCol="0" anchor="ctr"/>
+          <a:lstStyle/>
+          <a:p>
+            <a:pPr algn="ctr"/>
+            <a:endParaRPr lang="en-US"/>
           </a:p>
         </p:txBody>
       </p:sp>
     </p:spTree>
     <p:extLst>
       <p:ext uri="{BB962C8B-B14F-4D97-AF65-F5344CB8AC3E}">
-        <p14:creationId xmlns:p14="http://schemas.microsoft.com/office/powerpoint/2010/main" val="2673877809"/>
+        <p14:creationId xmlns:p14="http://schemas.microsoft.com/office/powerpoint/2010/main" val="801792881"/>
       </p:ext>
     </p:extLst>
   </p:cSld>
@@ -3893,46 +4057,246 @@
           <a:p>
             <a:r>
               <a:rPr lang="en-US" dirty="0" smtClean="0"/>
-              <a:t>Over View of OWCI Software</a:t>
+              <a:t>Function Blocks of OWCI Software</a:t>
             </a:r>
             <a:endParaRPr lang="en-US" dirty="0"/>
           </a:p>
         </p:txBody>
       </p:sp>
-      <p:pic>
-        <p:nvPicPr>
-          <p:cNvPr id="4" name="Picture 3"/>
-          <p:cNvPicPr>
-            <a:picLocks noChangeAspect="1"/>
-          </p:cNvPicPr>
+      <p:sp>
+        <p:nvSpPr>
+          <p:cNvPr id="6" name="Content Placeholder 5"/>
+          <p:cNvSpPr>
+            <a:spLocks noGrp="1"/>
+          </p:cNvSpPr>
+          <p:nvPr>
+            <p:ph idx="1"/>
+          </p:nvPr>
+        </p:nvSpPr>
+        <p:spPr/>
+        <p:txBody>
+          <a:bodyPr>
+            <a:normAutofit fontScale="62500" lnSpcReduction="20000"/>
+          </a:bodyPr>
+          <a:lstStyle/>
+          <a:p>
+            <a:r>
+              <a:rPr lang="en-US" b="1" dirty="0" smtClean="0"/>
+              <a:t>General Setting</a:t>
+            </a:r>
+          </a:p>
+          <a:p>
+            <a:pPr lvl="1"/>
+            <a:r>
+              <a:rPr lang="en-US" dirty="0" smtClean="0"/>
+              <a:t>Hardware control, include pilot width and device address.</a:t>
+            </a:r>
+          </a:p>
+          <a:p>
+            <a:pPr lvl="1"/>
+            <a:endParaRPr lang="en-US" dirty="0" smtClean="0"/>
+          </a:p>
+          <a:p>
+            <a:r>
+              <a:rPr lang="en-US" b="1" dirty="0" smtClean="0"/>
+              <a:t>Test Mode</a:t>
+            </a:r>
+          </a:p>
+          <a:p>
+            <a:pPr lvl="1"/>
+            <a:r>
+              <a:rPr lang="en-US" dirty="0" smtClean="0"/>
+              <a:t>Enter Test Mode, supporting different DUTs.</a:t>
+            </a:r>
+          </a:p>
+          <a:p>
+            <a:pPr lvl="1"/>
+            <a:endParaRPr lang="en-US" dirty="0" smtClean="0"/>
+          </a:p>
+          <a:p>
+            <a:r>
+              <a:rPr lang="en-US" b="1" dirty="0" smtClean="0"/>
+              <a:t>Registers Read/Write</a:t>
+            </a:r>
+          </a:p>
+          <a:p>
+            <a:pPr lvl="1"/>
+            <a:r>
+              <a:rPr lang="en-US" dirty="0" smtClean="0"/>
+              <a:t>Single or burst registers read or write</a:t>
+            </a:r>
+            <a:r>
+              <a:rPr lang="en-US" dirty="0" smtClean="0"/>
+              <a:t>.</a:t>
+            </a:r>
+          </a:p>
+          <a:p>
+            <a:pPr lvl="1"/>
+            <a:endParaRPr lang="en-US" b="1" dirty="0" smtClean="0"/>
+          </a:p>
+          <a:p>
+            <a:r>
+              <a:rPr lang="en-US" b="1" dirty="0" smtClean="0"/>
+              <a:t>Fuse</a:t>
+            </a:r>
+            <a:endParaRPr lang="en-US" b="1" dirty="0"/>
+          </a:p>
+          <a:p>
+            <a:pPr lvl="1"/>
+            <a:r>
+              <a:rPr lang="en-US" dirty="0"/>
+              <a:t>Support </a:t>
+            </a:r>
+            <a:r>
+              <a:rPr lang="en-US" dirty="0" err="1"/>
+              <a:t>eFuse</a:t>
+            </a:r>
+            <a:r>
+              <a:rPr lang="en-US" dirty="0"/>
+              <a:t>.</a:t>
+            </a:r>
+          </a:p>
+          <a:p>
+            <a:pPr marL="457200" lvl="1" indent="0">
+              <a:buNone/>
+            </a:pPr>
+            <a:endParaRPr lang="en-US" dirty="0" smtClean="0"/>
+          </a:p>
+          <a:p>
+            <a:r>
+              <a:rPr lang="en-US" b="1" dirty="0" smtClean="0"/>
+              <a:t>OTP Window</a:t>
+            </a:r>
+          </a:p>
+          <a:p>
+            <a:pPr lvl="1"/>
+            <a:r>
+              <a:rPr lang="en-US" dirty="0" smtClean="0"/>
+              <a:t>OTP operation, bit by bit or byte by byte, load data from a .txt file and save data to a .txt file.</a:t>
+            </a:r>
+          </a:p>
+          <a:p>
+            <a:pPr lvl="1"/>
+            <a:endParaRPr lang="en-US" dirty="0" smtClean="0"/>
+          </a:p>
+          <a:p>
+            <a:r>
+              <a:rPr lang="en-US" b="1" dirty="0" smtClean="0"/>
+              <a:t>Script Window</a:t>
+            </a:r>
+          </a:p>
+          <a:p>
+            <a:pPr lvl="1"/>
+            <a:r>
+              <a:rPr lang="en-US" dirty="0" smtClean="0"/>
+              <a:t>Load script from a .txt file and execute, edit a script and execute or save to .txt file.</a:t>
+            </a:r>
+          </a:p>
+          <a:p>
+            <a:pPr marL="457200" lvl="1" indent="0">
+              <a:buNone/>
+            </a:pPr>
+            <a:endParaRPr lang="en-US" dirty="0" smtClean="0"/>
+          </a:p>
+          <a:p>
+            <a:r>
+              <a:rPr lang="en-US" b="1" dirty="0" smtClean="0"/>
+              <a:t>Operation log</a:t>
+            </a:r>
+          </a:p>
+          <a:p>
+            <a:pPr lvl="1"/>
+            <a:r>
+              <a:rPr lang="en-US" dirty="0" smtClean="0"/>
+              <a:t>Display all the operations include commands and return data</a:t>
+            </a:r>
+          </a:p>
+          <a:p>
+            <a:endParaRPr lang="en-US" dirty="0" smtClean="0"/>
+          </a:p>
+          <a:p>
+            <a:endParaRPr lang="en-US" dirty="0" smtClean="0"/>
+          </a:p>
+          <a:p>
+            <a:endParaRPr lang="en-US" dirty="0"/>
+          </a:p>
+        </p:txBody>
+      </p:sp>
+      <p:sp>
+        <p:nvSpPr>
+          <p:cNvPr id="3" name="圆角矩形 2"/>
+          <p:cNvSpPr/>
           <p:nvPr/>
-        </p:nvPicPr>
-        <p:blipFill>
-          <a:blip r:embed="rId2">
-            <a:extLst>
-              <a:ext uri="{28A0092B-C50C-407E-A947-70E740481C1C}">
-                <a14:useLocalDpi xmlns:a14="http://schemas.microsoft.com/office/drawing/2010/main" val="0"/>
-              </a:ext>
-            </a:extLst>
-          </a:blip>
-          <a:stretch>
-            <a:fillRect/>
-          </a:stretch>
-        </p:blipFill>
-        <p:spPr>
-          <a:xfrm>
-            <a:off x="76200" y="955636"/>
-            <a:ext cx="8991600" cy="5826164"/>
+        </p:nvSpPr>
+        <p:spPr>
+          <a:xfrm>
+            <a:off x="228600" y="990600"/>
+            <a:ext cx="5943600" cy="2514600"/>
+          </a:xfrm>
+          <a:prstGeom prst="roundRect">
+            <a:avLst/>
+          </a:prstGeom>
+          <a:noFill/>
+        </p:spPr>
+        <p:style>
+          <a:lnRef idx="2">
+            <a:schemeClr val="accent1">
+              <a:shade val="50000"/>
+            </a:schemeClr>
+          </a:lnRef>
+          <a:fillRef idx="1">
+            <a:schemeClr val="accent1"/>
+          </a:fillRef>
+          <a:effectRef idx="0">
+            <a:schemeClr val="accent1"/>
+          </a:effectRef>
+          <a:fontRef idx="minor">
+            <a:schemeClr val="lt1"/>
+          </a:fontRef>
+        </p:style>
+        <p:txBody>
+          <a:bodyPr rtlCol="0" anchor="ctr"/>
+          <a:lstStyle/>
+          <a:p>
+            <a:pPr algn="ctr"/>
+            <a:endParaRPr lang="en-US"/>
+          </a:p>
+        </p:txBody>
+      </p:sp>
+      <p:sp>
+        <p:nvSpPr>
+          <p:cNvPr id="4" name="矩形 3"/>
+          <p:cNvSpPr/>
+          <p:nvPr/>
+        </p:nvSpPr>
+        <p:spPr>
+          <a:xfrm>
+            <a:off x="5791200" y="1687016"/>
+            <a:ext cx="2819400" cy="923330"/>
           </a:xfrm>
           <a:prstGeom prst="rect">
             <a:avLst/>
           </a:prstGeom>
         </p:spPr>
-      </p:pic>
+        <p:txBody>
+          <a:bodyPr wrap="square">
+            <a:spAutoFit/>
+          </a:bodyPr>
+          <a:lstStyle/>
+          <a:p>
+            <a:pPr lvl="1"/>
+            <a:r>
+              <a:rPr lang="en-US" i="1" dirty="0"/>
+              <a:t>These operations are almost the same as last version software.</a:t>
+            </a:r>
+            <a:endParaRPr lang="en-US" i="1" dirty="0"/>
+          </a:p>
+        </p:txBody>
+      </p:sp>
     </p:spTree>
     <p:extLst>
       <p:ext uri="{BB962C8B-B14F-4D97-AF65-F5344CB8AC3E}">
-        <p14:creationId xmlns:p14="http://schemas.microsoft.com/office/powerpoint/2010/main" val="801792881"/>
+        <p14:creationId xmlns:p14="http://schemas.microsoft.com/office/powerpoint/2010/main" val="2673877809"/>
       </p:ext>
     </p:extLst>
   </p:cSld>
@@ -3983,7 +4347,7 @@
           <a:p>
             <a:r>
               <a:rPr lang="en-US" dirty="0" smtClean="0"/>
-              <a:t>Blocks Review 1</a:t>
+              <a:t>New Features</a:t>
             </a:r>
             <a:endParaRPr lang="en-US" dirty="0"/>
           </a:p>
@@ -4001,42 +4365,124 @@
         </p:nvSpPr>
         <p:spPr/>
         <p:txBody>
-          <a:bodyPr/>
+          <a:bodyPr>
+            <a:normAutofit/>
+          </a:bodyPr>
           <a:lstStyle/>
           <a:p>
             <a:r>
+              <a:rPr lang="en-US" b="1" dirty="0" smtClean="0"/>
+              <a:t>OTP window</a:t>
+            </a:r>
+          </a:p>
+          <a:p>
+            <a:pPr lvl="1"/>
+            <a:r>
               <a:rPr lang="en-US" dirty="0"/>
-              <a:t>General </a:t>
+              <a:t>Advantages:</a:t>
+            </a:r>
+          </a:p>
+          <a:p>
+            <a:pPr lvl="2"/>
+            <a:r>
+              <a:rPr lang="en-US" dirty="0"/>
+              <a:t>1. Totally new designed tools for </a:t>
+            </a:r>
+            <a:r>
+              <a:rPr lang="en-US" dirty="0" err="1"/>
+              <a:t>eMemery</a:t>
+            </a:r>
+            <a:r>
+              <a:rPr lang="en-US" dirty="0"/>
+              <a:t> operation in </a:t>
             </a:r>
             <a:r>
               <a:rPr lang="en-US" dirty="0" smtClean="0"/>
-              <a:t>Setting, </a:t>
-            </a:r>
-          </a:p>
-          <a:p>
+              <a:t>md008, could be re-used in future project as well;</a:t>
+            </a:r>
+            <a:endParaRPr lang="en-US" dirty="0"/>
+          </a:p>
+          <a:p>
+            <a:pPr lvl="2"/>
+            <a:r>
+              <a:rPr lang="en-US" dirty="0"/>
+              <a:t>2. For each project, software will initialize OTP window based on a default </a:t>
+            </a:r>
+            <a:r>
+              <a:rPr lang="en-US" dirty="0" err="1"/>
+              <a:t>config</a:t>
+            </a:r>
+            <a:r>
+              <a:rPr lang="en-US" dirty="0"/>
+              <a:t> file, no need to rebuild a new GUI</a:t>
+            </a:r>
             <a:r>
               <a:rPr lang="en-US" dirty="0" smtClean="0"/>
-              <a:t>Test Mode, </a:t>
-            </a:r>
-          </a:p>
-          <a:p>
+              <a:t>.</a:t>
+            </a:r>
+            <a:endParaRPr lang="en-US" b="1" dirty="0" smtClean="0"/>
+          </a:p>
+          <a:p>
+            <a:r>
+              <a:rPr lang="en-US" b="1" dirty="0" smtClean="0"/>
+              <a:t>Script window</a:t>
+            </a:r>
+          </a:p>
+          <a:p>
+            <a:pPr lvl="1"/>
+            <a:r>
+              <a:rPr lang="en-US" dirty="0"/>
+              <a:t>Advantages:</a:t>
+            </a:r>
+          </a:p>
+          <a:p>
+            <a:pPr lvl="2"/>
+            <a:r>
+              <a:rPr lang="en-US" dirty="0"/>
+              <a:t>1. </a:t>
+            </a:r>
             <a:r>
               <a:rPr lang="en-US" dirty="0" smtClean="0"/>
-              <a:t>Registers Read/Write,</a:t>
-            </a:r>
-          </a:p>
-          <a:p>
+              <a:t>Script operation is a simple, flexible and efficient way for both PE and designers to do validation;</a:t>
+            </a:r>
+            <a:endParaRPr lang="en-US" dirty="0"/>
+          </a:p>
+          <a:p>
+            <a:pPr lvl="2"/>
+            <a:r>
+              <a:rPr lang="en-US" dirty="0"/>
+              <a:t>2. For each project, </a:t>
+            </a:r>
             <a:r>
               <a:rPr lang="en-US" dirty="0" smtClean="0"/>
-              <a:t>Fuse.</a:t>
-            </a:r>
-          </a:p>
-          <a:p>
-            <a:pPr lvl="1"/>
+              <a:t>no </a:t>
+            </a:r>
+            <a:r>
+              <a:rPr lang="en-US" dirty="0"/>
+              <a:t>need to rebuild a new </a:t>
+            </a:r>
             <a:r>
               <a:rPr lang="en-US" dirty="0" smtClean="0"/>
-              <a:t>These operations are almost the same as last version software.</a:t>
-            </a:r>
+              <a:t>GUI, just write new script and execute;</a:t>
+            </a:r>
+          </a:p>
+          <a:p>
+            <a:pPr lvl="2"/>
+            <a:r>
+              <a:rPr lang="en-US" dirty="0" smtClean="0"/>
+              <a:t>3. Script file is easy save and re-used between different sites.</a:t>
+            </a:r>
+          </a:p>
+          <a:p>
+            <a:pPr marL="914400" lvl="2" indent="0">
+              <a:buNone/>
+            </a:pPr>
+            <a:endParaRPr lang="en-US" dirty="0"/>
+          </a:p>
+          <a:p>
+            <a:endParaRPr lang="en-US" b="1" dirty="0" smtClean="0"/>
+          </a:p>
+          <a:p>
             <a:endParaRPr lang="en-US" dirty="0"/>
           </a:p>
           <a:p>
@@ -4098,7 +4544,11 @@
           <a:p>
             <a:r>
               <a:rPr lang="en-US" dirty="0" smtClean="0"/>
-              <a:t>Blocks Review 2</a:t>
+              <a:t>Blocks </a:t>
+            </a:r>
+            <a:r>
+              <a:rPr lang="en-US" dirty="0" smtClean="0"/>
+              <a:t>Review – OTP window</a:t>
             </a:r>
             <a:endParaRPr lang="en-US" dirty="0"/>
           </a:p>
@@ -4117,12 +4567,12 @@
         <p:spPr>
           <a:xfrm>
             <a:off x="228600" y="990600"/>
-            <a:ext cx="5943600" cy="5135563"/>
+            <a:ext cx="4671060" cy="5135563"/>
           </a:xfrm>
         </p:spPr>
         <p:txBody>
           <a:bodyPr>
-            <a:normAutofit fontScale="92500" lnSpcReduction="20000"/>
+            <a:normAutofit fontScale="85000" lnSpcReduction="20000"/>
           </a:bodyPr>
           <a:lstStyle/>
           <a:p>
@@ -4139,7 +4589,19 @@
             <a:pPr lvl="1"/>
             <a:r>
               <a:rPr lang="en-US" sz="2200" dirty="0" smtClean="0"/>
-              <a:t>Edit the window directly, supporting edit bit by bit or byte by byte, and blow OTP;</a:t>
+              <a:t>Edit the window directly, supporting edit bit by bit or byte by byte, and </a:t>
+            </a:r>
+            <a:r>
+              <a:rPr lang="en-US" sz="2200" dirty="0" smtClean="0"/>
+              <a:t>write OTP or </a:t>
+            </a:r>
+            <a:r>
+              <a:rPr lang="en-US" sz="2200" dirty="0" smtClean="0"/>
+              <a:t>blow </a:t>
+            </a:r>
+            <a:r>
+              <a:rPr lang="en-US" sz="2200" dirty="0" smtClean="0"/>
+              <a:t>OTP;</a:t>
             </a:r>
           </a:p>
           <a:p>
@@ -4161,7 +4623,15 @@
             <a:pPr lvl="1"/>
             <a:r>
               <a:rPr lang="en-US" sz="2200" dirty="0" smtClean="0"/>
-              <a:t>Load data form a .txt file as right format, and blow OTP;</a:t>
+              <a:t>Load data form a .txt file as right format, </a:t>
+            </a:r>
+            <a:r>
+              <a:rPr lang="en-US" sz="2200" dirty="0" smtClean="0"/>
+              <a:t>and write OTP or </a:t>
+            </a:r>
+            <a:r>
+              <a:rPr lang="en-US" sz="2200" dirty="0" smtClean="0"/>
+              <a:t>blow OTP;</a:t>
             </a:r>
           </a:p>
           <a:p>
@@ -4176,11 +4646,23 @@
             </a:r>
             <a:r>
               <a:rPr lang="en-US" sz="2200" dirty="0" smtClean="0"/>
-              <a:t>fter load, also can edit the updated window, and then save to a file or blow </a:t>
+              <a:t>fter load, also can edit the updated window, and then save to a </a:t>
             </a:r>
             <a:r>
               <a:rPr lang="en-US" sz="2200" dirty="0" smtClean="0"/>
-              <a:t>OTP;</a:t>
+              <a:t>file, write </a:t>
+            </a:r>
+            <a:r>
+              <a:rPr lang="en-US" sz="2200" dirty="0" smtClean="0"/>
+              <a:t>OTP </a:t>
+            </a:r>
+            <a:r>
+              <a:rPr lang="en-US" sz="2200" dirty="0" smtClean="0"/>
+              <a:t>or </a:t>
+            </a:r>
+            <a:r>
+              <a:rPr lang="en-US" sz="2200" dirty="0" smtClean="0"/>
+              <a:t>blow OTP;</a:t>
             </a:r>
           </a:p>
           <a:p>
@@ -4270,14 +4752,6 @@
               </a:rPr>
               <a:t> must be in same directory).</a:t>
             </a:r>
-            <a:endParaRPr lang="en-US" sz="1900" i="1" dirty="0" smtClean="0">
-              <a:solidFill>
-                <a:schemeClr val="accent1">
-                  <a:lumMod val="90000"/>
-                  <a:lumOff val="10000"/>
-                </a:schemeClr>
-              </a:solidFill>
-            </a:endParaRPr>
           </a:p>
           <a:p>
             <a:pPr marL="457200" lvl="1" indent="0">
@@ -4322,7 +4796,7 @@
         </p:blipFill>
         <p:spPr>
           <a:xfrm>
-            <a:off x="6324600" y="990600"/>
+            <a:off x="5105400" y="990600"/>
             <a:ext cx="2491740" cy="5394960"/>
           </a:xfrm>
           <a:prstGeom prst="rect">
@@ -4338,13 +4812,13 @@
         </p:nvSpPr>
         <p:spPr>
           <a:xfrm>
-            <a:off x="7696200" y="1905000"/>
-            <a:ext cx="1348740" cy="1046630"/>
+            <a:off x="5943600" y="255073"/>
+            <a:ext cx="2148840" cy="501051"/>
           </a:xfrm>
           <a:prstGeom prst="wedgeRoundRectCallout">
             <a:avLst>
-              <a:gd name="adj1" fmla="val -77151"/>
-              <a:gd name="adj2" fmla="val -75201"/>
+              <a:gd name="adj1" fmla="val -53158"/>
+              <a:gd name="adj2" fmla="val 122086"/>
               <a:gd name="adj3" fmla="val 16667"/>
             </a:avLst>
           </a:prstGeom>
@@ -4377,7 +4851,7 @@
           <a:p>
             <a:pPr algn="ctr"/>
             <a:r>
-              <a:rPr lang="en-US" dirty="0" smtClean="0">
+              <a:rPr lang="en-US" i="1" dirty="0" smtClean="0">
                 <a:solidFill>
                   <a:schemeClr val="tx1"/>
                 </a:solidFill>
@@ -4385,7 +4859,7 @@
               <a:t>OTP </a:t>
             </a:r>
             <a:r>
-              <a:rPr lang="en-US" dirty="0">
+              <a:rPr lang="en-US" i="1" dirty="0">
                 <a:solidFill>
                   <a:schemeClr val="tx1"/>
                 </a:solidFill>
@@ -4393,14 +4867,22 @@
               <a:t>s</a:t>
             </a:r>
             <a:r>
-              <a:rPr lang="en-US" dirty="0" smtClean="0">
+              <a:rPr lang="en-US" i="1" dirty="0" smtClean="0">
                 <a:solidFill>
                   <a:schemeClr val="tx1"/>
                 </a:solidFill>
               </a:rPr>
-              <a:t>etting name</a:t>
-            </a:r>
-            <a:endParaRPr lang="en-US" dirty="0">
+              <a:t>etting </a:t>
+            </a:r>
+            <a:r>
+              <a:rPr lang="en-US" i="1" dirty="0" smtClean="0">
+                <a:solidFill>
+                  <a:schemeClr val="tx1"/>
+                </a:solidFill>
+              </a:rPr>
+              <a:t>file</a:t>
+            </a:r>
+            <a:endParaRPr lang="en-US" i="1" dirty="0">
               <a:solidFill>
                 <a:schemeClr val="tx1"/>
               </a:solidFill>
@@ -4416,13 +4898,170 @@
         </p:nvCxnSpPr>
         <p:spPr>
           <a:xfrm>
-            <a:off x="6477000" y="1600200"/>
-            <a:ext cx="1828800" cy="0"/>
+            <a:off x="5181600" y="1600200"/>
+            <a:ext cx="2362200" cy="10668"/>
           </a:xfrm>
           <a:prstGeom prst="line">
             <a:avLst/>
           </a:prstGeom>
           <a:ln w="19050"/>
+        </p:spPr>
+        <p:style>
+          <a:lnRef idx="1">
+            <a:schemeClr val="accent1"/>
+          </a:lnRef>
+          <a:fillRef idx="0">
+            <a:schemeClr val="accent1"/>
+          </a:fillRef>
+          <a:effectRef idx="0">
+            <a:schemeClr val="accent1"/>
+          </a:effectRef>
+          <a:fontRef idx="minor">
+            <a:schemeClr val="tx1"/>
+          </a:fontRef>
+        </p:style>
+      </p:cxnSp>
+      <p:pic>
+        <p:nvPicPr>
+          <p:cNvPr id="5" name="图片 4"/>
+          <p:cNvPicPr>
+            <a:picLocks noChangeAspect="1"/>
+          </p:cNvPicPr>
+          <p:nvPr/>
+        </p:nvPicPr>
+        <p:blipFill>
+          <a:blip r:embed="rId3"/>
+          <a:stretch>
+            <a:fillRect/>
+          </a:stretch>
+        </p:blipFill>
+        <p:spPr>
+          <a:xfrm>
+            <a:off x="6553200" y="3429000"/>
+            <a:ext cx="2514600" cy="3174492"/>
+          </a:xfrm>
+          <a:prstGeom prst="rect">
+            <a:avLst/>
+          </a:prstGeom>
+        </p:spPr>
+      </p:pic>
+      <p:sp>
+        <p:nvSpPr>
+          <p:cNvPr id="12" name="Rounded Rectangular Callout 5"/>
+          <p:cNvSpPr/>
+          <p:nvPr/>
+        </p:nvSpPr>
+        <p:spPr>
+          <a:xfrm>
+            <a:off x="6899910" y="2819400"/>
+            <a:ext cx="1805940" cy="501051"/>
+          </a:xfrm>
+          <a:prstGeom prst="wedgeRoundRectCallout">
+            <a:avLst>
+              <a:gd name="adj1" fmla="val 5579"/>
+              <a:gd name="adj2" fmla="val 112402"/>
+              <a:gd name="adj3" fmla="val 16667"/>
+            </a:avLst>
+          </a:prstGeom>
+          <a:noFill/>
+          <a:ln>
+            <a:solidFill>
+              <a:schemeClr val="tx1"/>
+            </a:solidFill>
+          </a:ln>
+        </p:spPr>
+        <p:style>
+          <a:lnRef idx="2">
+            <a:schemeClr val="accent1">
+              <a:shade val="50000"/>
+            </a:schemeClr>
+          </a:lnRef>
+          <a:fillRef idx="1">
+            <a:schemeClr val="accent1"/>
+          </a:fillRef>
+          <a:effectRef idx="0">
+            <a:schemeClr val="accent1"/>
+          </a:effectRef>
+          <a:fontRef idx="minor">
+            <a:schemeClr val="lt1"/>
+          </a:fontRef>
+        </p:style>
+        <p:txBody>
+          <a:bodyPr rtlCol="0" anchor="ctr"/>
+          <a:lstStyle/>
+          <a:p>
+            <a:pPr algn="ctr"/>
+            <a:r>
+              <a:rPr lang="en-US" i="1" dirty="0" smtClean="0">
+                <a:solidFill>
+                  <a:schemeClr val="tx1"/>
+                </a:solidFill>
+              </a:rPr>
+              <a:t>OTP </a:t>
+            </a:r>
+            <a:r>
+              <a:rPr lang="en-US" i="1" dirty="0" smtClean="0">
+                <a:solidFill>
+                  <a:schemeClr val="tx1"/>
+                </a:solidFill>
+              </a:rPr>
+              <a:t>Window</a:t>
+            </a:r>
+            <a:endParaRPr lang="en-US" i="1" dirty="0">
+              <a:solidFill>
+                <a:schemeClr val="tx1"/>
+              </a:solidFill>
+            </a:endParaRPr>
+          </a:p>
+        </p:txBody>
+      </p:sp>
+      <p:sp>
+        <p:nvSpPr>
+          <p:cNvPr id="13" name="文本框 12"/>
+          <p:cNvSpPr txBox="1"/>
+          <p:nvPr/>
+        </p:nvSpPr>
+        <p:spPr>
+          <a:xfrm>
+            <a:off x="7464940" y="1524000"/>
+            <a:ext cx="2209800" cy="276999"/>
+          </a:xfrm>
+          <a:prstGeom prst="rect">
+            <a:avLst/>
+          </a:prstGeom>
+          <a:noFill/>
+        </p:spPr>
+        <p:txBody>
+          <a:bodyPr wrap="square" rtlCol="0">
+            <a:spAutoFit/>
+          </a:bodyPr>
+          <a:lstStyle/>
+          <a:p>
+            <a:r>
+              <a:rPr lang="en-US" sz="1200" i="1" dirty="0" smtClean="0"/>
+              <a:t>OTP setting name</a:t>
+            </a:r>
+            <a:endParaRPr lang="en-US" sz="1200" i="1" dirty="0"/>
+          </a:p>
+        </p:txBody>
+      </p:sp>
+      <p:cxnSp>
+        <p:nvCxnSpPr>
+          <p:cNvPr id="15" name="直接箭头连接符 14"/>
+          <p:cNvCxnSpPr/>
+          <p:nvPr/>
+        </p:nvCxnSpPr>
+        <p:spPr>
+          <a:xfrm>
+            <a:off x="5334000" y="1676400"/>
+            <a:ext cx="3048000" cy="2286000"/>
+          </a:xfrm>
+          <a:prstGeom prst="straightConnector1">
+            <a:avLst/>
+          </a:prstGeom>
+          <a:ln>
+            <a:tailEnd type="triangle"/>
+          </a:ln>
         </p:spPr>
         <p:style>
           <a:lnRef idx="1">
@@ -4441,18 +5080,21 @@
       </p:cxnSp>
       <p:cxnSp>
         <p:nvCxnSpPr>
-          <p:cNvPr id="9" name="Straight Connector 8"/>
+          <p:cNvPr id="18" name="直接箭头连接符 17"/>
           <p:cNvCxnSpPr/>
           <p:nvPr/>
         </p:nvCxnSpPr>
         <p:spPr>
-          <a:xfrm flipH="1" flipV="1">
-            <a:off x="6629400" y="1676400"/>
-            <a:ext cx="609600" cy="304800"/>
-          </a:xfrm>
-          <a:prstGeom prst="line">
+          <a:xfrm>
+            <a:off x="5334000" y="2971800"/>
+            <a:ext cx="3048000" cy="2590800"/>
+          </a:xfrm>
+          <a:prstGeom prst="straightConnector1">
             <a:avLst/>
           </a:prstGeom>
+          <a:ln>
+            <a:tailEnd type="triangle"/>
+          </a:ln>
         </p:spPr>
         <p:style>
           <a:lnRef idx="1">
@@ -4469,20 +5111,64 @@
           </a:fontRef>
         </p:style>
       </p:cxnSp>
+      <p:sp>
+        <p:nvSpPr>
+          <p:cNvPr id="25" name="椭圆 24"/>
+          <p:cNvSpPr/>
+          <p:nvPr/>
+        </p:nvSpPr>
+        <p:spPr>
+          <a:xfrm>
+            <a:off x="5128260" y="1567851"/>
+            <a:ext cx="281940" cy="184749"/>
+          </a:xfrm>
+          <a:prstGeom prst="ellipse">
+            <a:avLst/>
+          </a:prstGeom>
+          <a:noFill/>
+        </p:spPr>
+        <p:style>
+          <a:lnRef idx="2">
+            <a:schemeClr val="accent1">
+              <a:shade val="50000"/>
+            </a:schemeClr>
+          </a:lnRef>
+          <a:fillRef idx="1">
+            <a:schemeClr val="accent1"/>
+          </a:fillRef>
+          <a:effectRef idx="0">
+            <a:schemeClr val="accent1"/>
+          </a:effectRef>
+          <a:fontRef idx="minor">
+            <a:schemeClr val="lt1"/>
+          </a:fontRef>
+        </p:style>
+        <p:txBody>
+          <a:bodyPr rtlCol="0" anchor="ctr"/>
+          <a:lstStyle/>
+          <a:p>
+            <a:pPr algn="ctr"/>
+            <a:endParaRPr lang="en-US"/>
+          </a:p>
+        </p:txBody>
+      </p:sp>
       <p:cxnSp>
         <p:nvCxnSpPr>
-          <p:cNvPr id="11" name="Straight Connector 10"/>
+          <p:cNvPr id="21" name="直接箭头连接符 20"/>
           <p:cNvCxnSpPr/>
           <p:nvPr/>
         </p:nvCxnSpPr>
         <p:spPr>
-          <a:xfrm flipH="1">
-            <a:off x="6629400" y="4419600"/>
-            <a:ext cx="609600" cy="1676400"/>
-          </a:xfrm>
-          <a:prstGeom prst="line">
+          <a:xfrm>
+            <a:off x="5334000" y="3749040"/>
+            <a:ext cx="3048000" cy="2745069"/>
+          </a:xfrm>
+          <a:prstGeom prst="straightConnector1">
             <a:avLst/>
           </a:prstGeom>
+          <a:ln>
+            <a:tailEnd type="triangle"/>
+          </a:ln>
         </p:spPr>
         <p:style>
           <a:lnRef idx="1">
@@ -4499,6 +5185,88 @@
           </a:fontRef>
         </p:style>
       </p:cxnSp>
+      <p:sp>
+        <p:nvSpPr>
+          <p:cNvPr id="28" name="椭圆 27"/>
+          <p:cNvSpPr/>
+          <p:nvPr/>
+        </p:nvSpPr>
+        <p:spPr>
+          <a:xfrm>
+            <a:off x="5146160" y="2845164"/>
+            <a:ext cx="281940" cy="184749"/>
+          </a:xfrm>
+          <a:prstGeom prst="ellipse">
+            <a:avLst/>
+          </a:prstGeom>
+          <a:noFill/>
+        </p:spPr>
+        <p:style>
+          <a:lnRef idx="2">
+            <a:schemeClr val="accent1">
+              <a:shade val="50000"/>
+            </a:schemeClr>
+          </a:lnRef>
+          <a:fillRef idx="1">
+            <a:schemeClr val="accent1"/>
+          </a:fillRef>
+          <a:effectRef idx="0">
+            <a:schemeClr val="accent1"/>
+          </a:effectRef>
+          <a:fontRef idx="minor">
+            <a:schemeClr val="lt1"/>
+          </a:fontRef>
+        </p:style>
+        <p:txBody>
+          <a:bodyPr rtlCol="0" anchor="ctr"/>
+          <a:lstStyle/>
+          <a:p>
+            <a:pPr algn="ctr"/>
+            <a:endParaRPr lang="en-US"/>
+          </a:p>
+        </p:txBody>
+      </p:sp>
+      <p:sp>
+        <p:nvSpPr>
+          <p:cNvPr id="29" name="椭圆 28"/>
+          <p:cNvSpPr/>
+          <p:nvPr/>
+        </p:nvSpPr>
+        <p:spPr>
+          <a:xfrm>
+            <a:off x="5128260" y="3639657"/>
+            <a:ext cx="281940" cy="184749"/>
+          </a:xfrm>
+          <a:prstGeom prst="ellipse">
+            <a:avLst/>
+          </a:prstGeom>
+          <a:noFill/>
+        </p:spPr>
+        <p:style>
+          <a:lnRef idx="2">
+            <a:schemeClr val="accent1">
+              <a:shade val="50000"/>
+            </a:schemeClr>
+          </a:lnRef>
+          <a:fillRef idx="1">
+            <a:schemeClr val="accent1"/>
+          </a:fillRef>
+          <a:effectRef idx="0">
+            <a:schemeClr val="accent1"/>
+          </a:effectRef>
+          <a:fontRef idx="minor">
+            <a:schemeClr val="lt1"/>
+          </a:fontRef>
+        </p:style>
+        <p:txBody>
+          <a:bodyPr rtlCol="0" anchor="ctr"/>
+          <a:lstStyle/>
+          <a:p>
+            <a:pPr algn="ctr"/>
+            <a:endParaRPr lang="en-US"/>
+          </a:p>
+        </p:txBody>
+      </p:sp>
     </p:spTree>
     <p:extLst>
       <p:ext uri="{BB962C8B-B14F-4D97-AF65-F5344CB8AC3E}">
@@ -4552,8 +5320,8 @@
           <a:lstStyle/>
           <a:p>
             <a:r>
-              <a:rPr lang="en-US" dirty="0" smtClean="0"/>
-              <a:t>Blocks Review 3</a:t>
+              <a:rPr lang="en-US" dirty="0"/>
+              <a:t>Blocks Review – Script window</a:t>
             </a:r>
             <a:endParaRPr lang="en-US" dirty="0"/>
           </a:p>
@@ -4572,7 +5340,7 @@
         <p:spPr>
           <a:xfrm>
             <a:off x="228600" y="990600"/>
-            <a:ext cx="5257800" cy="5135563"/>
+            <a:ext cx="5038725" cy="5135563"/>
           </a:xfrm>
         </p:spPr>
         <p:txBody>
@@ -4631,11 +5399,7 @@
             <a:pPr lvl="1"/>
             <a:r>
               <a:rPr lang="en-US" sz="2200" dirty="0" smtClean="0"/>
-              <a:t>After load script, also can edit in the updated window, and then choose to save to a new file or execute</a:t>
-            </a:r>
-            <a:r>
-              <a:rPr lang="en-US" sz="2200" dirty="0" smtClean="0"/>
-              <a:t>.</a:t>
+              <a:t>After load script, also can edit in the updated window, and then choose to save to a new file or execute.</a:t>
             </a:r>
           </a:p>
           <a:p>
@@ -4646,11 +5410,7 @@
             <a:pPr lvl="1"/>
             <a:r>
               <a:rPr lang="en-US" sz="2200" dirty="0"/>
-              <a:t>Command line supporting, ext.               </a:t>
-            </a:r>
-            <a:r>
-              <a:rPr lang="en-US" sz="2200" dirty="0"/>
-              <a:t>              </a:t>
+              <a:t>Command line supporting, ext.                             </a:t>
             </a:r>
             <a:r>
               <a:rPr lang="en-US" sz="2000" i="1" dirty="0" smtClean="0">
@@ -4709,56 +5469,26 @@
       </p:sp>
       <p:pic>
         <p:nvPicPr>
-          <p:cNvPr id="2050" name="Picture 2"/>
+          <p:cNvPr id="14" name="图片 13"/>
           <p:cNvPicPr>
-            <a:picLocks noChangeAspect="1" noChangeArrowheads="1"/>
+            <a:picLocks noChangeAspect="1"/>
           </p:cNvPicPr>
           <p:nvPr/>
         </p:nvPicPr>
         <p:blipFill>
-          <a:blip r:embed="rId2">
-            <a:extLst>
-              <a:ext uri="{28A0092B-C50C-407E-A947-70E740481C1C}">
-                <a14:useLocalDpi xmlns:a14="http://schemas.microsoft.com/office/drawing/2010/main" val="0"/>
-              </a:ext>
-            </a:extLst>
-          </a:blip>
-          <a:srcRect/>
+          <a:blip r:embed="rId2"/>
           <a:stretch>
             <a:fillRect/>
           </a:stretch>
         </p:blipFill>
-        <p:spPr bwMode="auto">
-          <a:xfrm>
-            <a:off x="5267325" y="1600200"/>
-            <a:ext cx="3571875" cy="3095625"/>
+        <p:spPr>
+          <a:xfrm>
+            <a:off x="5334001" y="766902"/>
+            <a:ext cx="3810000" cy="4867275"/>
           </a:xfrm>
           <a:prstGeom prst="rect">
             <a:avLst/>
           </a:prstGeom>
-          <a:noFill/>
-          <a:ln>
-            <a:noFill/>
-          </a:ln>
-          <a:extLst>
-            <a:ext uri="{909E8E84-426E-40DD-AFC4-6F175D3DCCD1}">
-              <a14:hiddenFill xmlns:a14="http://schemas.microsoft.com/office/drawing/2010/main">
-                <a:solidFill>
-                  <a:schemeClr val="accent1"/>
-                </a:solidFill>
-              </a14:hiddenFill>
-            </a:ext>
-            <a:ext uri="{91240B29-F687-4F45-9708-019B960494DF}">
-              <a14:hiddenLine xmlns:a14="http://schemas.microsoft.com/office/drawing/2010/main" w="9525">
-                <a:solidFill>
-                  <a:schemeClr val="tx1"/>
-                </a:solidFill>
-                <a:miter lim="800000"/>
-                <a:headEnd/>
-                <a:tailEnd/>
-              </a14:hiddenLine>
-            </a:ext>
-          </a:extLst>
         </p:spPr>
       </p:pic>
       <p:sp>
@@ -4769,7 +5499,7 @@
         </p:nvSpPr>
         <p:spPr>
           <a:xfrm>
-            <a:off x="5486400" y="4366736"/>
+            <a:off x="5403888" y="5738178"/>
             <a:ext cx="3505200" cy="369332"/>
           </a:xfrm>
           <a:prstGeom prst="rect">
@@ -4807,13 +5537,13 @@
         </p:nvSpPr>
         <p:spPr>
           <a:xfrm>
-            <a:off x="5410200" y="990600"/>
-            <a:ext cx="1828800" cy="381000"/>
+            <a:off x="6410045" y="235953"/>
+            <a:ext cx="1314730" cy="381000"/>
           </a:xfrm>
           <a:prstGeom prst="wedgeRoundRectCallout">
             <a:avLst>
-              <a:gd name="adj1" fmla="val -5707"/>
-              <a:gd name="adj2" fmla="val 269559"/>
+              <a:gd name="adj1" fmla="val -70649"/>
+              <a:gd name="adj2" fmla="val 99040"/>
               <a:gd name="adj3" fmla="val 16667"/>
             </a:avLst>
           </a:prstGeom>
@@ -4846,14 +5576,22 @@
           <a:p>
             <a:pPr algn="ctr"/>
             <a:r>
-              <a:rPr lang="en-US" dirty="0" smtClean="0">
+              <a:rPr lang="en-US" i="1" dirty="0" smtClean="0">
                 <a:solidFill>
                   <a:schemeClr val="tx1"/>
                 </a:solidFill>
               </a:rPr>
-              <a:t>Script name</a:t>
-            </a:r>
-            <a:endParaRPr lang="en-US" dirty="0">
+              <a:t>Script </a:t>
+            </a:r>
+            <a:r>
+              <a:rPr lang="en-US" i="1" dirty="0" smtClean="0">
+                <a:solidFill>
+                  <a:schemeClr val="tx1"/>
+                </a:solidFill>
+              </a:rPr>
+              <a:t>file</a:t>
+            </a:r>
+            <a:endParaRPr lang="en-US" i="1" dirty="0">
               <a:solidFill>
                 <a:schemeClr val="tx1"/>
               </a:solidFill>
@@ -4861,91 +5599,28 @@
           </a:p>
         </p:txBody>
       </p:sp>
-      <p:cxnSp>
-        <p:nvCxnSpPr>
-          <p:cNvPr id="8" name="Straight Connector 7"/>
-          <p:cNvCxnSpPr/>
-          <p:nvPr/>
-        </p:nvCxnSpPr>
-        <p:spPr>
-          <a:xfrm>
-            <a:off x="5410200" y="2362200"/>
-            <a:ext cx="3352800" cy="0"/>
-          </a:xfrm>
-          <a:prstGeom prst="line">
-            <a:avLst/>
-          </a:prstGeom>
-          <a:ln w="19050"/>
-        </p:spPr>
-        <p:style>
-          <a:lnRef idx="1">
-            <a:schemeClr val="accent1"/>
-          </a:lnRef>
-          <a:fillRef idx="0">
-            <a:schemeClr val="accent1"/>
-          </a:fillRef>
-          <a:effectRef idx="0">
-            <a:schemeClr val="accent1"/>
-          </a:effectRef>
-          <a:fontRef idx="minor">
-            <a:schemeClr val="tx1"/>
-          </a:fontRef>
-        </p:style>
-      </p:cxnSp>
-      <p:cxnSp>
-        <p:nvCxnSpPr>
-          <p:cNvPr id="10" name="Straight Connector 9"/>
-          <p:cNvCxnSpPr/>
-          <p:nvPr/>
-        </p:nvCxnSpPr>
-        <p:spPr>
-          <a:xfrm>
-            <a:off x="5410200" y="2667000"/>
-            <a:ext cx="2286000" cy="0"/>
-          </a:xfrm>
-          <a:prstGeom prst="line">
-            <a:avLst/>
-          </a:prstGeom>
-          <a:ln w="19050"/>
-        </p:spPr>
-        <p:style>
-          <a:lnRef idx="1">
-            <a:schemeClr val="accent1"/>
-          </a:lnRef>
-          <a:fillRef idx="0">
-            <a:schemeClr val="accent1"/>
-          </a:fillRef>
-          <a:effectRef idx="0">
-            <a:schemeClr val="accent1"/>
-          </a:effectRef>
-          <a:fontRef idx="minor">
-            <a:schemeClr val="tx1"/>
-          </a:fontRef>
-        </p:style>
-      </p:cxnSp>
-      <p:sp>
-        <p:nvSpPr>
-          <p:cNvPr id="11" name="Rounded Rectangular Callout 10"/>
+      <p:sp>
+        <p:nvSpPr>
+          <p:cNvPr id="7" name="矩形 6"/>
           <p:cNvSpPr/>
           <p:nvPr/>
         </p:nvSpPr>
         <p:spPr>
           <a:xfrm>
-            <a:off x="7268135" y="1515035"/>
-            <a:ext cx="1342465" cy="381000"/>
-          </a:xfrm>
-          <a:prstGeom prst="wedgeRoundRectCallout">
-            <a:avLst>
-              <a:gd name="adj1" fmla="val -70903"/>
-              <a:gd name="adj2" fmla="val 246030"/>
-              <a:gd name="adj3" fmla="val 16667"/>
-            </a:avLst>
+            <a:off x="5410200" y="1447800"/>
+            <a:ext cx="3505200" cy="4147223"/>
+          </a:xfrm>
+          <a:prstGeom prst="rect">
+            <a:avLst/>
           </a:prstGeom>
           <a:noFill/>
           <a:ln>
             <a:solidFill>
-              <a:schemeClr val="tx1"/>
+              <a:schemeClr val="accent1">
+                <a:shade val="50000"/>
+              </a:schemeClr>
             </a:solidFill>
+            <a:prstDash val="sysDash"/>
           </a:ln>
         </p:spPr>
         <p:style>
@@ -4969,27 +5644,111 @@
           <a:lstStyle/>
           <a:p>
             <a:pPr algn="ctr"/>
-            <a:r>
-              <a:rPr lang="en-US" dirty="0">
-                <a:solidFill>
-                  <a:schemeClr val="tx1"/>
-                </a:solidFill>
-              </a:rPr>
-              <a:t>C</a:t>
-            </a:r>
-            <a:r>
-              <a:rPr lang="en-US" dirty="0" smtClean="0">
-                <a:solidFill>
-                  <a:schemeClr val="tx1"/>
-                </a:solidFill>
-              </a:rPr>
-              <a:t>ommand</a:t>
-            </a:r>
-            <a:endParaRPr lang="en-US" dirty="0">
-              <a:solidFill>
-                <a:schemeClr val="tx1"/>
-              </a:solidFill>
-            </a:endParaRPr>
+            <a:endParaRPr lang="en-US"/>
+          </a:p>
+        </p:txBody>
+      </p:sp>
+      <p:sp>
+        <p:nvSpPr>
+          <p:cNvPr id="9" name="矩形 8"/>
+          <p:cNvSpPr/>
+          <p:nvPr/>
+        </p:nvSpPr>
+        <p:spPr>
+          <a:xfrm>
+            <a:off x="7603008" y="4896785"/>
+            <a:ext cx="1093569" cy="292388"/>
+          </a:xfrm>
+          <a:prstGeom prst="rect">
+            <a:avLst/>
+          </a:prstGeom>
+        </p:spPr>
+        <p:txBody>
+          <a:bodyPr wrap="none">
+            <a:spAutoFit/>
+          </a:bodyPr>
+          <a:lstStyle/>
+          <a:p>
+            <a:pPr algn="ctr"/>
+            <a:r>
+              <a:rPr lang="en-US" sz="1300" b="1" i="1" dirty="0" smtClean="0"/>
+              <a:t>Commands</a:t>
+            </a:r>
+            <a:endParaRPr lang="en-US" sz="1300" b="1" i="1" dirty="0"/>
+          </a:p>
+        </p:txBody>
+      </p:sp>
+      <p:sp>
+        <p:nvSpPr>
+          <p:cNvPr id="13" name="文本框 12"/>
+          <p:cNvSpPr txBox="1"/>
+          <p:nvPr/>
+        </p:nvSpPr>
+        <p:spPr>
+          <a:xfrm>
+            <a:off x="5334000" y="1066800"/>
+            <a:ext cx="3810000" cy="276999"/>
+          </a:xfrm>
+          <a:prstGeom prst="rect">
+            <a:avLst/>
+          </a:prstGeom>
+          <a:noFill/>
+          <a:ln w="22225">
+            <a:solidFill>
+              <a:schemeClr val="tx1"/>
+            </a:solidFill>
+            <a:prstDash val="sysDash"/>
+          </a:ln>
+        </p:spPr>
+        <p:txBody>
+          <a:bodyPr wrap="square" rtlCol="0">
+            <a:spAutoFit/>
+          </a:bodyPr>
+          <a:lstStyle/>
+          <a:p>
+            <a:r>
+              <a:rPr lang="en-US" sz="1200" i="1" dirty="0" smtClean="0"/>
+              <a:t>			</a:t>
+            </a:r>
+            <a:r>
+              <a:rPr lang="en-US" sz="1200" b="1" i="1" dirty="0" smtClean="0"/>
+              <a:t>Script name</a:t>
+            </a:r>
+            <a:endParaRPr lang="en-US" sz="1200" b="1" i="1" dirty="0"/>
+          </a:p>
+        </p:txBody>
+      </p:sp>
+      <p:sp>
+        <p:nvSpPr>
+          <p:cNvPr id="18" name="矩形 17"/>
+          <p:cNvSpPr/>
+          <p:nvPr/>
+        </p:nvSpPr>
+        <p:spPr>
+          <a:xfrm>
+            <a:off x="7394513" y="5102580"/>
+            <a:ext cx="1524000" cy="492443"/>
+          </a:xfrm>
+          <a:prstGeom prst="rect">
+            <a:avLst/>
+          </a:prstGeom>
+        </p:spPr>
+        <p:txBody>
+          <a:bodyPr wrap="square">
+            <a:spAutoFit/>
+          </a:bodyPr>
+          <a:lstStyle/>
+          <a:p>
+            <a:pPr algn="ctr"/>
+            <a:r>
+              <a:rPr lang="en-US" sz="1300" b="1" i="1" dirty="0"/>
+              <a:t>e</a:t>
+            </a:r>
+            <a:r>
+              <a:rPr lang="en-US" sz="1300" b="1" i="1" dirty="0" smtClean="0"/>
+              <a:t>xecute from line3 to line 29</a:t>
+            </a:r>
+            <a:endParaRPr lang="en-US" sz="1300" b="1" i="1" dirty="0"/>
           </a:p>
         </p:txBody>
       </p:sp>
@@ -5047,7 +5806,7 @@
           <a:p>
             <a:r>
               <a:rPr lang="en-US" dirty="0" smtClean="0"/>
-              <a:t>Supporting Commands </a:t>
+              <a:t>Description of Commands</a:t>
             </a:r>
             <a:endParaRPr lang="en-US" dirty="0"/>
           </a:p>
@@ -5063,7 +5822,12 @@
             <p:ph idx="1"/>
           </p:nvPr>
         </p:nvSpPr>
-        <p:spPr/>
+        <p:spPr>
+          <a:xfrm>
+            <a:off x="228600" y="990600"/>
+            <a:ext cx="8686800" cy="5135563"/>
+          </a:xfrm>
+        </p:spPr>
         <p:txBody>
           <a:bodyPr>
             <a:normAutofit fontScale="62500" lnSpcReduction="20000"/>
@@ -5076,26 +5840,59 @@
               </a:lnSpc>
             </a:pPr>
             <a:r>
-              <a:rPr lang="en-US" dirty="0" smtClean="0"/>
+              <a:rPr lang="en-US" dirty="0" smtClean="0">
+                <a:latin typeface="Cambria Math" panose="02040503050406030204" pitchFamily="18" charset="0"/>
+                <a:ea typeface="Cambria Math" panose="02040503050406030204" pitchFamily="18" charset="0"/>
+                <a:cs typeface="Times New Roman" panose="02020603050405020304" pitchFamily="18" charset="0"/>
+              </a:rPr>
               <a:t>Write: </a:t>
             </a:r>
             <a:r>
-              <a:rPr lang="en-US" dirty="0" err="1"/>
+              <a:rPr lang="en-US" dirty="0" err="1">
+                <a:latin typeface="Cambria Math" panose="02040503050406030204" pitchFamily="18" charset="0"/>
+                <a:ea typeface="Cambria Math" panose="02040503050406030204" pitchFamily="18" charset="0"/>
+                <a:cs typeface="Times New Roman" panose="02020603050405020304" pitchFamily="18" charset="0"/>
+              </a:rPr>
               <a:t>Addr</a:t>
             </a:r>
             <a:r>
-              <a:rPr lang="en-US" dirty="0"/>
+              <a:rPr lang="en-US" dirty="0">
+                <a:latin typeface="Cambria Math" panose="02040503050406030204" pitchFamily="18" charset="0"/>
+                <a:ea typeface="Cambria Math" panose="02040503050406030204" pitchFamily="18" charset="0"/>
+                <a:cs typeface="Times New Roman" panose="02020603050405020304" pitchFamily="18" charset="0"/>
+              </a:rPr>
               <a:t> 0x80; </a:t>
             </a:r>
             <a:r>
-              <a:rPr lang="en-US" dirty="0" smtClean="0"/>
+              <a:rPr lang="en-US" dirty="0" smtClean="0">
+                <a:latin typeface="Cambria Math" panose="02040503050406030204" pitchFamily="18" charset="0"/>
+                <a:ea typeface="Cambria Math" panose="02040503050406030204" pitchFamily="18" charset="0"/>
+                <a:cs typeface="Times New Roman" panose="02020603050405020304" pitchFamily="18" charset="0"/>
+              </a:rPr>
               <a:t>Data </a:t>
             </a:r>
             <a:r>
-              <a:rPr lang="en-US" dirty="0"/>
-              <a:t>0x10</a:t>
-            </a:r>
-            <a:endParaRPr lang="en-US" dirty="0" smtClean="0"/>
+              <a:rPr lang="en-US" dirty="0" smtClean="0">
+                <a:latin typeface="Cambria Math" panose="02040503050406030204" pitchFamily="18" charset="0"/>
+                <a:ea typeface="Cambria Math" panose="02040503050406030204" pitchFamily="18" charset="0"/>
+                <a:cs typeface="Times New Roman" panose="02020603050405020304" pitchFamily="18" charset="0"/>
+              </a:rPr>
+              <a:t>0x10		     	</a:t>
+            </a:r>
+            <a:r>
+              <a:rPr lang="en-US" sz="2100" i="1" dirty="0" smtClean="0">
+                <a:solidFill>
+                  <a:schemeClr val="accent2">
+                    <a:lumMod val="60000"/>
+                    <a:lumOff val="40000"/>
+                  </a:schemeClr>
+                </a:solidFill>
+                <a:latin typeface="Cambria Math" panose="02040503050406030204" pitchFamily="18" charset="0"/>
+                <a:ea typeface="Cambria Math" panose="02040503050406030204" pitchFamily="18" charset="0"/>
+                <a:cs typeface="Times New Roman" panose="02020603050405020304" pitchFamily="18" charset="0"/>
+              </a:rPr>
+              <a:t>//write value 0x10 to register 0x80</a:t>
+            </a:r>
           </a:p>
           <a:p>
             <a:pPr>
@@ -5104,17 +5901,70 @@
               </a:lnSpc>
             </a:pPr>
             <a:r>
-              <a:rPr lang="en-US" dirty="0" smtClean="0"/>
+              <a:rPr lang="en-US" dirty="0" smtClean="0">
+                <a:latin typeface="Cambria Math" panose="02040503050406030204" pitchFamily="18" charset="0"/>
+                <a:ea typeface="Cambria Math" panose="02040503050406030204" pitchFamily="18" charset="0"/>
+                <a:cs typeface="Times New Roman" panose="02020603050405020304" pitchFamily="18" charset="0"/>
+              </a:rPr>
               <a:t>Read: </a:t>
             </a:r>
             <a:r>
-              <a:rPr lang="en-US" dirty="0" err="1" smtClean="0"/>
+              <a:rPr lang="en-US" dirty="0" err="1" smtClean="0">
+                <a:latin typeface="Cambria Math" panose="02040503050406030204" pitchFamily="18" charset="0"/>
+                <a:ea typeface="Cambria Math" panose="02040503050406030204" pitchFamily="18" charset="0"/>
+                <a:cs typeface="Times New Roman" panose="02020603050405020304" pitchFamily="18" charset="0"/>
+              </a:rPr>
               <a:t>Addr</a:t>
             </a:r>
             <a:r>
-              <a:rPr lang="en-US" dirty="0" smtClean="0"/>
-              <a:t> 0x80</a:t>
-            </a:r>
+              <a:rPr lang="en-US" dirty="0" smtClean="0">
+                <a:latin typeface="Cambria Math" panose="02040503050406030204" pitchFamily="18" charset="0"/>
+                <a:ea typeface="Cambria Math" panose="02040503050406030204" pitchFamily="18" charset="0"/>
+                <a:cs typeface="Times New Roman" panose="02020603050405020304" pitchFamily="18" charset="0"/>
+              </a:rPr>
+              <a:t> </a:t>
+            </a:r>
+            <a:r>
+              <a:rPr lang="en-US" dirty="0">
+                <a:latin typeface="Cambria Math" panose="02040503050406030204" pitchFamily="18" charset="0"/>
+                <a:ea typeface="Cambria Math" panose="02040503050406030204" pitchFamily="18" charset="0"/>
+                <a:cs typeface="Times New Roman" panose="02020603050405020304" pitchFamily="18" charset="0"/>
+              </a:rPr>
+              <a:t>0x80 </a:t>
+            </a:r>
+            <a:r>
+              <a:rPr lang="en-US" dirty="0" smtClean="0">
+                <a:latin typeface="Cambria Math" panose="02040503050406030204" pitchFamily="18" charset="0"/>
+                <a:ea typeface="Cambria Math" panose="02040503050406030204" pitchFamily="18" charset="0"/>
+                <a:cs typeface="Times New Roman" panose="02020603050405020304" pitchFamily="18" charset="0"/>
+              </a:rPr>
+              <a:t>				</a:t>
+            </a:r>
+            <a:r>
+              <a:rPr lang="en-US" sz="2100" i="1" dirty="0" smtClean="0">
+                <a:solidFill>
+                  <a:schemeClr val="accent2">
+                    <a:lumMod val="60000"/>
+                    <a:lumOff val="40000"/>
+                  </a:schemeClr>
+                </a:solidFill>
+                <a:latin typeface="Cambria Math" panose="02040503050406030204" pitchFamily="18" charset="0"/>
+                <a:ea typeface="Cambria Math" panose="02040503050406030204" pitchFamily="18" charset="0"/>
+                <a:cs typeface="Times New Roman" panose="02020603050405020304" pitchFamily="18" charset="0"/>
+              </a:rPr>
+              <a:t>//Read value of register 0x80</a:t>
+            </a:r>
+            <a:endParaRPr lang="en-US" sz="2100" i="1" dirty="0">
+              <a:solidFill>
+                <a:schemeClr val="accent2">
+                  <a:lumMod val="60000"/>
+                  <a:lumOff val="40000"/>
+                </a:schemeClr>
+              </a:solidFill>
+              <a:latin typeface="Cambria Math" panose="02040503050406030204" pitchFamily="18" charset="0"/>
+              <a:ea typeface="Cambria Math" panose="02040503050406030204" pitchFamily="18" charset="0"/>
+              <a:cs typeface="Times New Roman" panose="02020603050405020304" pitchFamily="18" charset="0"/>
+            </a:endParaRPr>
           </a:p>
           <a:p>
             <a:pPr>
@@ -5123,33 +5973,88 @@
               </a:lnSpc>
             </a:pPr>
             <a:r>
-              <a:rPr lang="en-US" dirty="0" err="1" smtClean="0"/>
+              <a:rPr lang="en-US" dirty="0" err="1" smtClean="0">
+                <a:latin typeface="Cambria Math" panose="02040503050406030204" pitchFamily="18" charset="0"/>
+                <a:ea typeface="Cambria Math" panose="02040503050406030204" pitchFamily="18" charset="0"/>
+                <a:cs typeface="Times New Roman" panose="02020603050405020304" pitchFamily="18" charset="0"/>
+              </a:rPr>
               <a:t>BurstWrite</a:t>
             </a:r>
             <a:r>
-              <a:rPr lang="en-US" dirty="0" smtClean="0"/>
+              <a:rPr lang="en-US" dirty="0" smtClean="0">
+                <a:latin typeface="Cambria Math" panose="02040503050406030204" pitchFamily="18" charset="0"/>
+                <a:ea typeface="Cambria Math" panose="02040503050406030204" pitchFamily="18" charset="0"/>
+                <a:cs typeface="Times New Roman" panose="02020603050405020304" pitchFamily="18" charset="0"/>
+              </a:rPr>
               <a:t>: </a:t>
             </a:r>
             <a:r>
-              <a:rPr lang="en-US" dirty="0" err="1"/>
+              <a:rPr lang="en-US" dirty="0" err="1">
+                <a:latin typeface="Cambria Math" panose="02040503050406030204" pitchFamily="18" charset="0"/>
+                <a:ea typeface="Cambria Math" panose="02040503050406030204" pitchFamily="18" charset="0"/>
+                <a:cs typeface="Times New Roman" panose="02020603050405020304" pitchFamily="18" charset="0"/>
+              </a:rPr>
               <a:t>Addr</a:t>
             </a:r>
             <a:r>
-              <a:rPr lang="en-US" dirty="0"/>
+              <a:rPr lang="en-US" dirty="0">
+                <a:latin typeface="Cambria Math" panose="02040503050406030204" pitchFamily="18" charset="0"/>
+                <a:ea typeface="Cambria Math" panose="02040503050406030204" pitchFamily="18" charset="0"/>
+                <a:cs typeface="Times New Roman" panose="02020603050405020304" pitchFamily="18" charset="0"/>
+              </a:rPr>
               <a:t> 0x80; </a:t>
             </a:r>
             <a:r>
-              <a:rPr lang="en-US" dirty="0" err="1"/>
+              <a:rPr lang="en-US" dirty="0" err="1">
+                <a:latin typeface="Cambria Math" panose="02040503050406030204" pitchFamily="18" charset="0"/>
+                <a:ea typeface="Cambria Math" panose="02040503050406030204" pitchFamily="18" charset="0"/>
+                <a:cs typeface="Times New Roman" panose="02020603050405020304" pitchFamily="18" charset="0"/>
+              </a:rPr>
               <a:t>Num</a:t>
             </a:r>
             <a:r>
-              <a:rPr lang="en-US" dirty="0"/>
+              <a:rPr lang="en-US" dirty="0">
+                <a:latin typeface="Cambria Math" panose="02040503050406030204" pitchFamily="18" charset="0"/>
+                <a:ea typeface="Cambria Math" panose="02040503050406030204" pitchFamily="18" charset="0"/>
+                <a:cs typeface="Times New Roman" panose="02020603050405020304" pitchFamily="18" charset="0"/>
+              </a:rPr>
               <a:t> </a:t>
             </a:r>
             <a:r>
-              <a:rPr lang="en-US" dirty="0" smtClean="0"/>
-              <a:t>0x10; Data 0x00</a:t>
-            </a:r>
+              <a:rPr lang="en-US" dirty="0" smtClean="0">
+                <a:latin typeface="Cambria Math" panose="02040503050406030204" pitchFamily="18" charset="0"/>
+                <a:ea typeface="Cambria Math" panose="02040503050406030204" pitchFamily="18" charset="0"/>
+                <a:cs typeface="Times New Roman" panose="02020603050405020304" pitchFamily="18" charset="0"/>
+              </a:rPr>
+              <a:t>0x10; Data </a:t>
+            </a:r>
+            <a:r>
+              <a:rPr lang="en-US" dirty="0" smtClean="0">
+                <a:latin typeface="Cambria Math" panose="02040503050406030204" pitchFamily="18" charset="0"/>
+                <a:ea typeface="Cambria Math" panose="02040503050406030204" pitchFamily="18" charset="0"/>
+                <a:cs typeface="Times New Roman" panose="02020603050405020304" pitchFamily="18" charset="0"/>
+              </a:rPr>
+              <a:t>0x03</a:t>
+            </a:r>
+            <a:r>
+              <a:rPr lang="en-US" sz="2100" i="1" dirty="0" smtClean="0">
+                <a:solidFill>
+                  <a:srgbClr val="9C3022">
+                    <a:lumMod val="60000"/>
+                    <a:lumOff val="40000"/>
+                  </a:srgbClr>
+                </a:solidFill>
+                <a:latin typeface="Cambria Math" panose="02040503050406030204" pitchFamily="18" charset="0"/>
+                <a:ea typeface="Cambria Math" panose="02040503050406030204" pitchFamily="18" charset="0"/>
+                <a:cs typeface="Times New Roman" panose="02020603050405020304" pitchFamily="18" charset="0"/>
+              </a:rPr>
+              <a:t> 	//Burst write 0x03 to register 0x80-0x8A</a:t>
+            </a:r>
+            <a:endParaRPr lang="en-US" dirty="0" smtClean="0">
+              <a:latin typeface="Cambria Math" panose="02040503050406030204" pitchFamily="18" charset="0"/>
+              <a:ea typeface="Cambria Math" panose="02040503050406030204" pitchFamily="18" charset="0"/>
+              <a:cs typeface="Times New Roman" panose="02020603050405020304" pitchFamily="18" charset="0"/>
+            </a:endParaRPr>
           </a:p>
           <a:p>
             <a:pPr>
@@ -5158,28 +6063,88 @@
               </a:lnSpc>
             </a:pPr>
             <a:r>
-              <a:rPr lang="en-US" dirty="0" err="1" smtClean="0"/>
+              <a:rPr lang="en-US" dirty="0" err="1" smtClean="0">
+                <a:latin typeface="Cambria Math" panose="02040503050406030204" pitchFamily="18" charset="0"/>
+                <a:ea typeface="Cambria Math" panose="02040503050406030204" pitchFamily="18" charset="0"/>
+                <a:cs typeface="Times New Roman" panose="02020603050405020304" pitchFamily="18" charset="0"/>
+              </a:rPr>
               <a:t>BurstRead</a:t>
             </a:r>
             <a:r>
-              <a:rPr lang="en-US" dirty="0" smtClean="0"/>
+              <a:rPr lang="en-US" dirty="0" smtClean="0">
+                <a:latin typeface="Cambria Math" panose="02040503050406030204" pitchFamily="18" charset="0"/>
+                <a:ea typeface="Cambria Math" panose="02040503050406030204" pitchFamily="18" charset="0"/>
+                <a:cs typeface="Times New Roman" panose="02020603050405020304" pitchFamily="18" charset="0"/>
+              </a:rPr>
               <a:t>: </a:t>
             </a:r>
             <a:r>
-              <a:rPr lang="en-US" dirty="0" err="1" smtClean="0"/>
+              <a:rPr lang="en-US" dirty="0" err="1" smtClean="0">
+                <a:latin typeface="Cambria Math" panose="02040503050406030204" pitchFamily="18" charset="0"/>
+                <a:ea typeface="Cambria Math" panose="02040503050406030204" pitchFamily="18" charset="0"/>
+                <a:cs typeface="Times New Roman" panose="02020603050405020304" pitchFamily="18" charset="0"/>
+              </a:rPr>
               <a:t>Addr</a:t>
             </a:r>
             <a:r>
-              <a:rPr lang="en-US" dirty="0" smtClean="0"/>
+              <a:rPr lang="en-US" dirty="0" smtClean="0">
+                <a:latin typeface="Cambria Math" panose="02040503050406030204" pitchFamily="18" charset="0"/>
+                <a:ea typeface="Cambria Math" panose="02040503050406030204" pitchFamily="18" charset="0"/>
+                <a:cs typeface="Times New Roman" panose="02020603050405020304" pitchFamily="18" charset="0"/>
+              </a:rPr>
               <a:t> 0x80; </a:t>
             </a:r>
             <a:r>
-              <a:rPr lang="en-US" dirty="0" err="1" smtClean="0"/>
+              <a:rPr lang="en-US" dirty="0" err="1" smtClean="0">
+                <a:latin typeface="Cambria Math" panose="02040503050406030204" pitchFamily="18" charset="0"/>
+                <a:ea typeface="Cambria Math" panose="02040503050406030204" pitchFamily="18" charset="0"/>
+                <a:cs typeface="Times New Roman" panose="02020603050405020304" pitchFamily="18" charset="0"/>
+              </a:rPr>
               <a:t>Num</a:t>
             </a:r>
             <a:r>
-              <a:rPr lang="en-US" dirty="0" smtClean="0"/>
-              <a:t> 0x10</a:t>
+              <a:rPr lang="en-US" dirty="0" smtClean="0">
+                <a:latin typeface="Cambria Math" panose="02040503050406030204" pitchFamily="18" charset="0"/>
+                <a:ea typeface="Cambria Math" panose="02040503050406030204" pitchFamily="18" charset="0"/>
+                <a:cs typeface="Times New Roman" panose="02020603050405020304" pitchFamily="18" charset="0"/>
+              </a:rPr>
+              <a:t> </a:t>
+            </a:r>
+            <a:r>
+              <a:rPr lang="en-US" dirty="0" smtClean="0">
+                <a:latin typeface="Cambria Math" panose="02040503050406030204" pitchFamily="18" charset="0"/>
+                <a:ea typeface="Cambria Math" panose="02040503050406030204" pitchFamily="18" charset="0"/>
+                <a:cs typeface="Times New Roman" panose="02020603050405020304" pitchFamily="18" charset="0"/>
+              </a:rPr>
+              <a:t>0x10			</a:t>
+            </a:r>
+            <a:r>
+              <a:rPr lang="en-US" sz="2100" i="1" dirty="0" smtClean="0">
+                <a:solidFill>
+                  <a:srgbClr val="9C3022">
+                    <a:lumMod val="60000"/>
+                    <a:lumOff val="40000"/>
+                  </a:srgbClr>
+                </a:solidFill>
+                <a:latin typeface="Cambria Math" panose="02040503050406030204" pitchFamily="18" charset="0"/>
+                <a:ea typeface="Cambria Math" panose="02040503050406030204" pitchFamily="18" charset="0"/>
+                <a:cs typeface="Times New Roman" panose="02020603050405020304" pitchFamily="18" charset="0"/>
+              </a:rPr>
+              <a:t>//</a:t>
+            </a:r>
+            <a:r>
+              <a:rPr lang="en-US" sz="2100" i="1" dirty="0">
+                <a:solidFill>
+                  <a:srgbClr val="9C3022">
+                    <a:lumMod val="60000"/>
+                    <a:lumOff val="40000"/>
+                  </a:srgbClr>
+                </a:solidFill>
+                <a:latin typeface="Cambria Math" panose="02040503050406030204" pitchFamily="18" charset="0"/>
+                <a:ea typeface="Cambria Math" panose="02040503050406030204" pitchFamily="18" charset="0"/>
+                <a:cs typeface="Times New Roman" panose="02020603050405020304" pitchFamily="18" charset="0"/>
+              </a:rPr>
+              <a:t>Burst Read values of register 0x80-0x8A</a:t>
             </a:r>
           </a:p>
           <a:p>
@@ -5189,13 +6154,62 @@
               </a:lnSpc>
             </a:pPr>
             <a:r>
-              <a:rPr lang="en-US" dirty="0" err="1" smtClean="0"/>
+              <a:rPr lang="en-US" dirty="0" err="1" smtClean="0">
+                <a:latin typeface="Cambria Math" panose="02040503050406030204" pitchFamily="18" charset="0"/>
+                <a:ea typeface="Cambria Math" panose="02040503050406030204" pitchFamily="18" charset="0"/>
+                <a:cs typeface="Times New Roman" panose="02020603050405020304" pitchFamily="18" charset="0"/>
+              </a:rPr>
               <a:t>SetPilot</a:t>
             </a:r>
             <a:r>
-              <a:rPr lang="en-US" dirty="0" smtClean="0"/>
-              <a:t>: 200us</a:t>
-            </a:r>
+              <a:rPr lang="en-US" dirty="0" smtClean="0">
+                <a:latin typeface="Cambria Math" panose="02040503050406030204" pitchFamily="18" charset="0"/>
+                <a:ea typeface="Cambria Math" panose="02040503050406030204" pitchFamily="18" charset="0"/>
+                <a:cs typeface="Times New Roman" panose="02020603050405020304" pitchFamily="18" charset="0"/>
+              </a:rPr>
+              <a:t>: </a:t>
+            </a:r>
+            <a:r>
+              <a:rPr lang="en-US" dirty="0" smtClean="0">
+                <a:latin typeface="Cambria Math" panose="02040503050406030204" pitchFamily="18" charset="0"/>
+                <a:ea typeface="Cambria Math" panose="02040503050406030204" pitchFamily="18" charset="0"/>
+                <a:cs typeface="Times New Roman" panose="02020603050405020304" pitchFamily="18" charset="0"/>
+              </a:rPr>
+              <a:t>200us		</a:t>
+            </a:r>
+            <a:r>
+              <a:rPr lang="en-US" sz="2100" i="1" dirty="0">
+                <a:solidFill>
+                  <a:srgbClr val="9C3022">
+                    <a:lumMod val="60000"/>
+                    <a:lumOff val="40000"/>
+                  </a:srgbClr>
+                </a:solidFill>
+                <a:latin typeface="Cambria Math" panose="02040503050406030204" pitchFamily="18" charset="0"/>
+                <a:ea typeface="Cambria Math" panose="02040503050406030204" pitchFamily="18" charset="0"/>
+                <a:cs typeface="Times New Roman" panose="02020603050405020304" pitchFamily="18" charset="0"/>
+              </a:rPr>
+              <a:t> </a:t>
+            </a:r>
+            <a:r>
+              <a:rPr lang="en-US" sz="2100" i="1" dirty="0" smtClean="0">
+                <a:solidFill>
+                  <a:srgbClr val="9C3022">
+                    <a:lumMod val="60000"/>
+                    <a:lumOff val="40000"/>
+                  </a:srgbClr>
+                </a:solidFill>
+                <a:latin typeface="Cambria Math" panose="02040503050406030204" pitchFamily="18" charset="0"/>
+                <a:ea typeface="Cambria Math" panose="02040503050406030204" pitchFamily="18" charset="0"/>
+                <a:cs typeface="Times New Roman" panose="02020603050405020304" pitchFamily="18" charset="0"/>
+              </a:rPr>
+              <a:t>			//Set pilot as 200us</a:t>
+            </a:r>
+            <a:endParaRPr lang="en-US" dirty="0" smtClean="0">
+              <a:latin typeface="Cambria Math" panose="02040503050406030204" pitchFamily="18" charset="0"/>
+              <a:ea typeface="Cambria Math" panose="02040503050406030204" pitchFamily="18" charset="0"/>
+              <a:cs typeface="Times New Roman" panose="02020603050405020304" pitchFamily="18" charset="0"/>
+            </a:endParaRPr>
           </a:p>
           <a:p>
             <a:pPr>
@@ -5204,12 +6218,26 @@
               </a:lnSpc>
             </a:pPr>
             <a:r>
-              <a:rPr lang="en-US" dirty="0" err="1" smtClean="0"/>
-              <a:t>SetDelay</a:t>
-            </a:r>
-            <a:r>
-              <a:rPr lang="en-US" dirty="0" smtClean="0"/>
-              <a:t>: 100ms</a:t>
+              <a:rPr lang="en-US" dirty="0" smtClean="0">
+                <a:latin typeface="Cambria Math" panose="02040503050406030204" pitchFamily="18" charset="0"/>
+                <a:ea typeface="Cambria Math" panose="02040503050406030204" pitchFamily="18" charset="0"/>
+                <a:cs typeface="Times New Roman" panose="02020603050405020304" pitchFamily="18" charset="0"/>
+              </a:rPr>
+              <a:t>Delay: 100ms					</a:t>
+            </a:r>
+            <a:r>
+              <a:rPr lang="en-US" sz="2100" i="1" dirty="0">
+                <a:solidFill>
+                  <a:srgbClr val="9C3022">
+                    <a:lumMod val="60000"/>
+                    <a:lumOff val="40000"/>
+                  </a:srgbClr>
+                </a:solidFill>
+                <a:latin typeface="Cambria Math" panose="02040503050406030204" pitchFamily="18" charset="0"/>
+                <a:ea typeface="Cambria Math" panose="02040503050406030204" pitchFamily="18" charset="0"/>
+                <a:cs typeface="Times New Roman" panose="02020603050405020304" pitchFamily="18" charset="0"/>
+              </a:rPr>
+              <a:t>//Delay 100ms</a:t>
             </a:r>
           </a:p>
           <a:p>
@@ -5219,8 +6247,56 @@
               </a:lnSpc>
             </a:pPr>
             <a:r>
-              <a:rPr lang="en-US" dirty="0" smtClean="0"/>
-              <a:t>Fuse: 160ns; 10ms</a:t>
+              <a:rPr lang="en-US" dirty="0" smtClean="0">
+                <a:latin typeface="Cambria Math" panose="02040503050406030204" pitchFamily="18" charset="0"/>
+                <a:ea typeface="Cambria Math" panose="02040503050406030204" pitchFamily="18" charset="0"/>
+                <a:cs typeface="Times New Roman" panose="02020603050405020304" pitchFamily="18" charset="0"/>
+              </a:rPr>
+              <a:t>Fuse</a:t>
+            </a:r>
+            <a:r>
+              <a:rPr lang="en-US" dirty="0" smtClean="0">
+                <a:latin typeface="Cambria Math" panose="02040503050406030204" pitchFamily="18" charset="0"/>
+                <a:ea typeface="Cambria Math" panose="02040503050406030204" pitchFamily="18" charset="0"/>
+                <a:cs typeface="Times New Roman" panose="02020603050405020304" pitchFamily="18" charset="0"/>
+              </a:rPr>
+              <a:t>: 160ns; </a:t>
+            </a:r>
+            <a:r>
+              <a:rPr lang="en-US" dirty="0" smtClean="0">
+                <a:latin typeface="Cambria Math" panose="02040503050406030204" pitchFamily="18" charset="0"/>
+                <a:ea typeface="Cambria Math" panose="02040503050406030204" pitchFamily="18" charset="0"/>
+                <a:cs typeface="Times New Roman" panose="02020603050405020304" pitchFamily="18" charset="0"/>
+              </a:rPr>
+              <a:t>10ms		       </a:t>
+            </a:r>
+            <a:r>
+              <a:rPr lang="en-US" sz="2100" i="1" dirty="0" smtClean="0">
+                <a:solidFill>
+                  <a:srgbClr val="9C3022">
+                    <a:lumMod val="60000"/>
+                    <a:lumOff val="40000"/>
+                  </a:srgbClr>
+                </a:solidFill>
+                <a:latin typeface="Cambria Math" panose="02040503050406030204" pitchFamily="18" charset="0"/>
+                <a:ea typeface="Cambria Math" panose="02040503050406030204" pitchFamily="18" charset="0"/>
+                <a:cs typeface="Times New Roman" panose="02020603050405020304" pitchFamily="18" charset="0"/>
+              </a:rPr>
+              <a:t>//</a:t>
+            </a:r>
+            <a:r>
+              <a:rPr lang="en-US" sz="2100" i="1" dirty="0">
+                <a:solidFill>
+                  <a:srgbClr val="9C3022">
+                    <a:lumMod val="60000"/>
+                    <a:lumOff val="40000"/>
+                  </a:srgbClr>
+                </a:solidFill>
+                <a:latin typeface="Cambria Math" panose="02040503050406030204" pitchFamily="18" charset="0"/>
+                <a:ea typeface="Cambria Math" panose="02040503050406030204" pitchFamily="18" charset="0"/>
+                <a:cs typeface="Times New Roman" panose="02020603050405020304" pitchFamily="18" charset="0"/>
+              </a:rPr>
+              <a:t>Set fuse pulse as 160ns, fuse clock duration as 10ms, and fuse</a:t>
             </a:r>
           </a:p>
           <a:p>
@@ -5230,12 +6306,48 @@
               </a:lnSpc>
             </a:pPr>
             <a:r>
-              <a:rPr lang="en-US" dirty="0" err="1" smtClean="0"/>
+              <a:rPr lang="en-US" dirty="0" err="1" smtClean="0">
+                <a:latin typeface="Cambria Math" panose="02040503050406030204" pitchFamily="18" charset="0"/>
+                <a:ea typeface="Cambria Math" panose="02040503050406030204" pitchFamily="18" charset="0"/>
+                <a:cs typeface="Times New Roman" panose="02020603050405020304" pitchFamily="18" charset="0"/>
+              </a:rPr>
               <a:t>WriteOTP</a:t>
             </a:r>
             <a:r>
-              <a:rPr lang="en-US" dirty="0" smtClean="0"/>
-              <a:t>:</a:t>
+              <a:rPr lang="en-US" dirty="0" smtClean="0">
+                <a:latin typeface="Cambria Math" panose="02040503050406030204" pitchFamily="18" charset="0"/>
+                <a:ea typeface="Cambria Math" panose="02040503050406030204" pitchFamily="18" charset="0"/>
+                <a:cs typeface="Times New Roman" panose="02020603050405020304" pitchFamily="18" charset="0"/>
+              </a:rPr>
+              <a:t>: 					</a:t>
+            </a:r>
+            <a:r>
+              <a:rPr lang="en-US" sz="2100" i="1" dirty="0" smtClean="0">
+                <a:solidFill>
+                  <a:srgbClr val="9C3022">
+                    <a:lumMod val="60000"/>
+                    <a:lumOff val="40000"/>
+                  </a:srgbClr>
+                </a:solidFill>
+                <a:latin typeface="Cambria Math" panose="02040503050406030204" pitchFamily="18" charset="0"/>
+                <a:ea typeface="Cambria Math" panose="02040503050406030204" pitchFamily="18" charset="0"/>
+                <a:cs typeface="Times New Roman" panose="02020603050405020304" pitchFamily="18" charset="0"/>
+              </a:rPr>
+              <a:t>//</a:t>
+            </a:r>
+            <a:r>
+              <a:rPr lang="en-US" sz="2100" i="1" dirty="0">
+                <a:solidFill>
+                  <a:srgbClr val="9C3022">
+                    <a:lumMod val="60000"/>
+                    <a:lumOff val="40000"/>
+                  </a:srgbClr>
+                </a:solidFill>
+                <a:latin typeface="Cambria Math" panose="02040503050406030204" pitchFamily="18" charset="0"/>
+                <a:ea typeface="Cambria Math" panose="02040503050406030204" pitchFamily="18" charset="0"/>
+                <a:cs typeface="Times New Roman" panose="02020603050405020304" pitchFamily="18" charset="0"/>
+              </a:rPr>
+              <a:t>Write OTP data to relative registers</a:t>
             </a:r>
           </a:p>
           <a:p>
@@ -5245,13 +6357,82 @@
               </a:lnSpc>
             </a:pPr>
             <a:r>
-              <a:rPr lang="en-US" dirty="0" err="1" smtClean="0"/>
+              <a:rPr lang="en-US" dirty="0" err="1" smtClean="0">
+                <a:latin typeface="Cambria Math" panose="02040503050406030204" pitchFamily="18" charset="0"/>
+                <a:ea typeface="Cambria Math" panose="02040503050406030204" pitchFamily="18" charset="0"/>
+                <a:cs typeface="Times New Roman" panose="02020603050405020304" pitchFamily="18" charset="0"/>
+              </a:rPr>
               <a:t>ReadOTP</a:t>
             </a:r>
             <a:r>
-              <a:rPr lang="en-US" dirty="0" smtClean="0"/>
+              <a:rPr lang="en-US" dirty="0" smtClean="0">
+                <a:latin typeface="Cambria Math" panose="02040503050406030204" pitchFamily="18" charset="0"/>
+                <a:ea typeface="Cambria Math" panose="02040503050406030204" pitchFamily="18" charset="0"/>
+                <a:cs typeface="Times New Roman" panose="02020603050405020304" pitchFamily="18" charset="0"/>
+              </a:rPr>
               <a:t>:</a:t>
             </a:r>
+            <a:r>
+              <a:rPr lang="en-US" sz="2100" i="1" dirty="0">
+                <a:solidFill>
+                  <a:srgbClr val="9C3022">
+                    <a:lumMod val="60000"/>
+                    <a:lumOff val="40000"/>
+                  </a:srgbClr>
+                </a:solidFill>
+                <a:latin typeface="Cambria Math" panose="02040503050406030204" pitchFamily="18" charset="0"/>
+                <a:ea typeface="Cambria Math" panose="02040503050406030204" pitchFamily="18" charset="0"/>
+                <a:cs typeface="Times New Roman" panose="02020603050405020304" pitchFamily="18" charset="0"/>
+              </a:rPr>
+              <a:t> </a:t>
+            </a:r>
+            <a:r>
+              <a:rPr lang="en-US" sz="2100" i="1" dirty="0" smtClean="0">
+                <a:solidFill>
+                  <a:srgbClr val="9C3022">
+                    <a:lumMod val="60000"/>
+                    <a:lumOff val="40000"/>
+                  </a:srgbClr>
+                </a:solidFill>
+                <a:latin typeface="Cambria Math" panose="02040503050406030204" pitchFamily="18" charset="0"/>
+                <a:ea typeface="Cambria Math" panose="02040503050406030204" pitchFamily="18" charset="0"/>
+                <a:cs typeface="Times New Roman" panose="02020603050405020304" pitchFamily="18" charset="0"/>
+              </a:rPr>
+              <a:t>					//Read </a:t>
+            </a:r>
+            <a:r>
+              <a:rPr lang="en-US" sz="2100" i="1" dirty="0">
+                <a:solidFill>
+                  <a:srgbClr val="9C3022">
+                    <a:lumMod val="60000"/>
+                    <a:lumOff val="40000"/>
+                  </a:srgbClr>
+                </a:solidFill>
+                <a:latin typeface="Cambria Math" panose="02040503050406030204" pitchFamily="18" charset="0"/>
+                <a:ea typeface="Cambria Math" panose="02040503050406030204" pitchFamily="18" charset="0"/>
+                <a:cs typeface="Times New Roman" panose="02020603050405020304" pitchFamily="18" charset="0"/>
+              </a:rPr>
+              <a:t>OTP </a:t>
+            </a:r>
+            <a:r>
+              <a:rPr lang="en-US" sz="2100" i="1" dirty="0" smtClean="0">
+                <a:solidFill>
+                  <a:srgbClr val="9C3022">
+                    <a:lumMod val="60000"/>
+                    <a:lumOff val="40000"/>
+                  </a:srgbClr>
+                </a:solidFill>
+                <a:latin typeface="Cambria Math" panose="02040503050406030204" pitchFamily="18" charset="0"/>
+                <a:ea typeface="Cambria Math" panose="02040503050406030204" pitchFamily="18" charset="0"/>
+                <a:cs typeface="Times New Roman" panose="02020603050405020304" pitchFamily="18" charset="0"/>
+              </a:rPr>
+              <a:t>data</a:t>
+            </a:r>
+            <a:endParaRPr lang="en-US" dirty="0" smtClean="0">
+              <a:latin typeface="Cambria Math" panose="02040503050406030204" pitchFamily="18" charset="0"/>
+              <a:ea typeface="Cambria Math" panose="02040503050406030204" pitchFamily="18" charset="0"/>
+              <a:cs typeface="Times New Roman" panose="02020603050405020304" pitchFamily="18" charset="0"/>
+            </a:endParaRPr>
           </a:p>
           <a:p>
             <a:pPr>
@@ -5260,13 +6441,54 @@
               </a:lnSpc>
             </a:pPr>
             <a:r>
-              <a:rPr lang="en-US" dirty="0" err="1" smtClean="0"/>
+              <a:rPr lang="en-US" dirty="0" err="1" smtClean="0">
+                <a:latin typeface="Cambria Math" panose="02040503050406030204" pitchFamily="18" charset="0"/>
+                <a:ea typeface="Cambria Math" panose="02040503050406030204" pitchFamily="18" charset="0"/>
+                <a:cs typeface="Times New Roman" panose="02020603050405020304" pitchFamily="18" charset="0"/>
+              </a:rPr>
               <a:t>BlowOTP</a:t>
             </a:r>
             <a:r>
-              <a:rPr lang="en-US" dirty="0" smtClean="0"/>
+              <a:rPr lang="en-US" dirty="0" smtClean="0">
+                <a:latin typeface="Cambria Math" panose="02040503050406030204" pitchFamily="18" charset="0"/>
+                <a:ea typeface="Cambria Math" panose="02040503050406030204" pitchFamily="18" charset="0"/>
+                <a:cs typeface="Times New Roman" panose="02020603050405020304" pitchFamily="18" charset="0"/>
+              </a:rPr>
               <a:t>:</a:t>
             </a:r>
+            <a:r>
+              <a:rPr lang="en-US" sz="2100" i="1" dirty="0">
+                <a:solidFill>
+                  <a:srgbClr val="9C3022">
+                    <a:lumMod val="60000"/>
+                    <a:lumOff val="40000"/>
+                  </a:srgbClr>
+                </a:solidFill>
+                <a:latin typeface="Cambria Math" panose="02040503050406030204" pitchFamily="18" charset="0"/>
+                <a:ea typeface="Cambria Math" panose="02040503050406030204" pitchFamily="18" charset="0"/>
+                <a:cs typeface="Times New Roman" panose="02020603050405020304" pitchFamily="18" charset="0"/>
+              </a:rPr>
+              <a:t> </a:t>
+            </a:r>
+            <a:r>
+              <a:rPr lang="en-US" sz="2100" i="1" dirty="0" smtClean="0">
+                <a:solidFill>
+                  <a:srgbClr val="9C3022">
+                    <a:lumMod val="60000"/>
+                    <a:lumOff val="40000"/>
+                  </a:srgbClr>
+                </a:solidFill>
+                <a:latin typeface="Cambria Math" panose="02040503050406030204" pitchFamily="18" charset="0"/>
+                <a:ea typeface="Cambria Math" panose="02040503050406030204" pitchFamily="18" charset="0"/>
+                <a:cs typeface="Times New Roman" panose="02020603050405020304" pitchFamily="18" charset="0"/>
+              </a:rPr>
+              <a:t>					//Blow OTP, take care of  POWER </a:t>
+            </a:r>
+            <a:endParaRPr lang="en-US" dirty="0" smtClean="0">
+              <a:latin typeface="Cambria Math" panose="02040503050406030204" pitchFamily="18" charset="0"/>
+              <a:ea typeface="Cambria Math" panose="02040503050406030204" pitchFamily="18" charset="0"/>
+              <a:cs typeface="Times New Roman" panose="02020603050405020304" pitchFamily="18" charset="0"/>
+            </a:endParaRPr>
           </a:p>
           <a:p>
             <a:pPr>
@@ -5275,13 +6497,54 @@
               </a:lnSpc>
             </a:pPr>
             <a:r>
-              <a:rPr lang="en-US" dirty="0" err="1" smtClean="0"/>
-              <a:t>SetLRasOwci</a:t>
-            </a:r>
-            <a:r>
-              <a:rPr lang="en-US" dirty="0" smtClean="0"/>
-              <a:t>:</a:t>
-            </a:r>
+              <a:rPr lang="en-US" dirty="0" err="1" smtClean="0">
+                <a:latin typeface="Cambria Math" panose="02040503050406030204" pitchFamily="18" charset="0"/>
+                <a:ea typeface="Cambria Math" panose="02040503050406030204" pitchFamily="18" charset="0"/>
+                <a:cs typeface="Times New Roman" panose="02020603050405020304" pitchFamily="18" charset="0"/>
+              </a:rPr>
+              <a:t>SetLrAsOwci</a:t>
+            </a:r>
+            <a:r>
+              <a:rPr lang="en-US" dirty="0" smtClean="0">
+                <a:latin typeface="Cambria Math" panose="02040503050406030204" pitchFamily="18" charset="0"/>
+                <a:ea typeface="Cambria Math" panose="02040503050406030204" pitchFamily="18" charset="0"/>
+                <a:cs typeface="Times New Roman" panose="02020603050405020304" pitchFamily="18" charset="0"/>
+              </a:rPr>
+              <a:t>: 	</a:t>
+            </a:r>
+            <a:r>
+              <a:rPr lang="en-US" sz="2100" i="1" dirty="0">
+                <a:solidFill>
+                  <a:srgbClr val="9C3022">
+                    <a:lumMod val="60000"/>
+                    <a:lumOff val="40000"/>
+                  </a:srgbClr>
+                </a:solidFill>
+                <a:latin typeface="Cambria Math" panose="02040503050406030204" pitchFamily="18" charset="0"/>
+                <a:ea typeface="Cambria Math" panose="02040503050406030204" pitchFamily="18" charset="0"/>
+                <a:cs typeface="Times New Roman" panose="02020603050405020304" pitchFamily="18" charset="0"/>
+              </a:rPr>
+              <a:t> </a:t>
+            </a:r>
+            <a:r>
+              <a:rPr lang="en-US" sz="2100" i="1" dirty="0" smtClean="0">
+                <a:solidFill>
+                  <a:srgbClr val="9C3022">
+                    <a:lumMod val="60000"/>
+                    <a:lumOff val="40000"/>
+                  </a:srgbClr>
+                </a:solidFill>
+                <a:latin typeface="Cambria Math" panose="02040503050406030204" pitchFamily="18" charset="0"/>
+                <a:ea typeface="Cambria Math" panose="02040503050406030204" pitchFamily="18" charset="0"/>
+                <a:cs typeface="Times New Roman" panose="02020603050405020304" pitchFamily="18" charset="0"/>
+              </a:rPr>
+              <a:t>				//Set LR pin on PCB as OWCI pin</a:t>
+            </a:r>
+            <a:endParaRPr lang="en-US" dirty="0" smtClean="0">
+              <a:latin typeface="Cambria Math" panose="02040503050406030204" pitchFamily="18" charset="0"/>
+              <a:ea typeface="Cambria Math" panose="02040503050406030204" pitchFamily="18" charset="0"/>
+              <a:cs typeface="Times New Roman" panose="02020603050405020304" pitchFamily="18" charset="0"/>
+            </a:endParaRPr>
           </a:p>
           <a:p>
             <a:pPr>
@@ -5290,13 +6553,82 @@
               </a:lnSpc>
             </a:pPr>
             <a:r>
-              <a:rPr lang="en-US" dirty="0" err="1" smtClean="0"/>
-              <a:t>SetConfigasOwci</a:t>
-            </a:r>
-            <a:r>
-              <a:rPr lang="en-US" dirty="0" smtClean="0"/>
-              <a:t>:</a:t>
-            </a:r>
+              <a:rPr lang="en-US" dirty="0" err="1" smtClean="0">
+                <a:latin typeface="Cambria Math" panose="02040503050406030204" pitchFamily="18" charset="0"/>
+                <a:ea typeface="Cambria Math" panose="02040503050406030204" pitchFamily="18" charset="0"/>
+                <a:cs typeface="Times New Roman" panose="02020603050405020304" pitchFamily="18" charset="0"/>
+              </a:rPr>
+              <a:t>SetConfigAsOwci</a:t>
+            </a:r>
+            <a:r>
+              <a:rPr lang="en-US" dirty="0" smtClean="0">
+                <a:latin typeface="Cambria Math" panose="02040503050406030204" pitchFamily="18" charset="0"/>
+                <a:ea typeface="Cambria Math" panose="02040503050406030204" pitchFamily="18" charset="0"/>
+                <a:cs typeface="Times New Roman" panose="02020603050405020304" pitchFamily="18" charset="0"/>
+              </a:rPr>
+              <a:t>: 				</a:t>
+            </a:r>
+            <a:r>
+              <a:rPr lang="en-US" sz="2100" i="1" dirty="0" smtClean="0">
+                <a:solidFill>
+                  <a:srgbClr val="9C3022">
+                    <a:lumMod val="60000"/>
+                    <a:lumOff val="40000"/>
+                  </a:srgbClr>
+                </a:solidFill>
+                <a:latin typeface="Cambria Math" panose="02040503050406030204" pitchFamily="18" charset="0"/>
+                <a:ea typeface="Cambria Math" panose="02040503050406030204" pitchFamily="18" charset="0"/>
+                <a:cs typeface="Times New Roman" panose="02020603050405020304" pitchFamily="18" charset="0"/>
+              </a:rPr>
+              <a:t> //</a:t>
+            </a:r>
+            <a:r>
+              <a:rPr lang="en-US" sz="2100" i="1" dirty="0">
+                <a:solidFill>
+                  <a:srgbClr val="9C3022">
+                    <a:lumMod val="60000"/>
+                    <a:lumOff val="40000"/>
+                  </a:srgbClr>
+                </a:solidFill>
+                <a:latin typeface="Cambria Math" panose="02040503050406030204" pitchFamily="18" charset="0"/>
+                <a:ea typeface="Cambria Math" panose="02040503050406030204" pitchFamily="18" charset="0"/>
+                <a:cs typeface="Times New Roman" panose="02020603050405020304" pitchFamily="18" charset="0"/>
+              </a:rPr>
+              <a:t> Set </a:t>
+            </a:r>
+            <a:r>
+              <a:rPr lang="en-US" sz="2100" i="1" dirty="0" smtClean="0">
+                <a:solidFill>
+                  <a:srgbClr val="9C3022">
+                    <a:lumMod val="60000"/>
+                    <a:lumOff val="40000"/>
+                  </a:srgbClr>
+                </a:solidFill>
+                <a:latin typeface="Cambria Math" panose="02040503050406030204" pitchFamily="18" charset="0"/>
+                <a:ea typeface="Cambria Math" panose="02040503050406030204" pitchFamily="18" charset="0"/>
+                <a:cs typeface="Times New Roman" panose="02020603050405020304" pitchFamily="18" charset="0"/>
+              </a:rPr>
+              <a:t>CONFIG </a:t>
+            </a:r>
+            <a:r>
+              <a:rPr lang="en-US" sz="2100" i="1" dirty="0">
+                <a:solidFill>
+                  <a:srgbClr val="9C3022">
+                    <a:lumMod val="60000"/>
+                    <a:lumOff val="40000"/>
+                  </a:srgbClr>
+                </a:solidFill>
+                <a:latin typeface="Cambria Math" panose="02040503050406030204" pitchFamily="18" charset="0"/>
+                <a:ea typeface="Cambria Math" panose="02040503050406030204" pitchFamily="18" charset="0"/>
+                <a:cs typeface="Times New Roman" panose="02020603050405020304" pitchFamily="18" charset="0"/>
+              </a:rPr>
+              <a:t>pin on PCB as OWCI pin</a:t>
+            </a:r>
+            <a:endParaRPr lang="en-US" dirty="0" smtClean="0">
+              <a:latin typeface="Cambria Math" panose="02040503050406030204" pitchFamily="18" charset="0"/>
+              <a:ea typeface="Cambria Math" panose="02040503050406030204" pitchFamily="18" charset="0"/>
+              <a:cs typeface="Times New Roman" panose="02020603050405020304" pitchFamily="18" charset="0"/>
+            </a:endParaRPr>
           </a:p>
           <a:p>
             <a:endParaRPr lang="en-US" dirty="0"/>

</xml_diff>